<commit_message>
added script to generate CPU load and updated challanges
</commit_message>
<xml_diff>
--- a/decks/Azure Monitoring Hackathon.pptx
+++ b/decks/Azure Monitoring Hackathon.pptx
@@ -141,90 +141,6 @@
 
 <file path=ppt/changesInfos/changesInfo1.xml><?xml version="1.0" encoding="utf-8"?>
 <pc:chgInfo xmlns:a="http://schemas.openxmlformats.org/drawingml/2006/main" xmlns:r="http://schemas.openxmlformats.org/officeDocument/2006/relationships" xmlns:ac="http://schemas.microsoft.com/office/drawing/2013/main/command" xmlns:pc="http://schemas.microsoft.com/office/powerpoint/2013/main/command">
-  <pc:docChgLst>
-    <pc:chgData name="Rob Kuehfus" userId="453d022f19b6df9a" providerId="LiveId" clId="{00300C55-CFA3-4DC3-A480-DB1F7B2B1E1F}"/>
-    <pc:docChg chg="custSel modSld">
-      <pc:chgData name="Rob Kuehfus" userId="453d022f19b6df9a" providerId="LiveId" clId="{00300C55-CFA3-4DC3-A480-DB1F7B2B1E1F}" dt="2018-06-01T12:41:30.354" v="123" actId="20577"/>
-      <pc:docMkLst>
-        <pc:docMk/>
-      </pc:docMkLst>
-      <pc:sldChg chg="modSp">
-        <pc:chgData name="Rob Kuehfus" userId="453d022f19b6df9a" providerId="LiveId" clId="{00300C55-CFA3-4DC3-A480-DB1F7B2B1E1F}" dt="2018-05-31T13:18:24.560" v="10" actId="13926"/>
-        <pc:sldMkLst>
-          <pc:docMk/>
-          <pc:sldMk cId="3353185689" sldId="257"/>
-        </pc:sldMkLst>
-        <pc:spChg chg="mod">
-          <ac:chgData name="Rob Kuehfus" userId="453d022f19b6df9a" providerId="LiveId" clId="{00300C55-CFA3-4DC3-A480-DB1F7B2B1E1F}" dt="2018-05-31T13:18:24.560" v="10" actId="13926"/>
-          <ac:spMkLst>
-            <pc:docMk/>
-            <pc:sldMk cId="3353185689" sldId="257"/>
-            <ac:spMk id="3" creationId="{AF88C286-9C1B-475A-8D11-F4C61E9EB7A9}"/>
-          </ac:spMkLst>
-        </pc:spChg>
-      </pc:sldChg>
-      <pc:sldChg chg="modSp">
-        <pc:chgData name="Rob Kuehfus" userId="453d022f19b6df9a" providerId="LiveId" clId="{00300C55-CFA3-4DC3-A480-DB1F7B2B1E1F}" dt="2018-05-31T12:26:38.782" v="9" actId="20577"/>
-        <pc:sldMkLst>
-          <pc:docMk/>
-          <pc:sldMk cId="979064255" sldId="259"/>
-        </pc:sldMkLst>
-        <pc:spChg chg="mod">
-          <ac:chgData name="Rob Kuehfus" userId="453d022f19b6df9a" providerId="LiveId" clId="{00300C55-CFA3-4DC3-A480-DB1F7B2B1E1F}" dt="2018-05-31T12:26:38.782" v="9" actId="20577"/>
-          <ac:spMkLst>
-            <pc:docMk/>
-            <pc:sldMk cId="979064255" sldId="259"/>
-            <ac:spMk id="3" creationId="{E583B256-EB77-4750-A793-27EDE3BD5BA1}"/>
-          </ac:spMkLst>
-        </pc:spChg>
-      </pc:sldChg>
-      <pc:sldChg chg="modSp">
-        <pc:chgData name="Rob Kuehfus" userId="453d022f19b6df9a" providerId="LiveId" clId="{00300C55-CFA3-4DC3-A480-DB1F7B2B1E1F}" dt="2018-06-01T12:41:30.354" v="123" actId="20577"/>
-        <pc:sldMkLst>
-          <pc:docMk/>
-          <pc:sldMk cId="2675988397" sldId="261"/>
-        </pc:sldMkLst>
-        <pc:spChg chg="mod">
-          <ac:chgData name="Rob Kuehfus" userId="453d022f19b6df9a" providerId="LiveId" clId="{00300C55-CFA3-4DC3-A480-DB1F7B2B1E1F}" dt="2018-06-01T12:41:30.354" v="123" actId="20577"/>
-          <ac:spMkLst>
-            <pc:docMk/>
-            <pc:sldMk cId="2675988397" sldId="261"/>
-            <ac:spMk id="3" creationId="{E583B256-EB77-4750-A793-27EDE3BD5BA1}"/>
-          </ac:spMkLst>
-        </pc:spChg>
-      </pc:sldChg>
-      <pc:sldChg chg="modSp">
-        <pc:chgData name="Rob Kuehfus" userId="453d022f19b6df9a" providerId="LiveId" clId="{00300C55-CFA3-4DC3-A480-DB1F7B2B1E1F}" dt="2018-05-31T16:39:37.088" v="15" actId="14"/>
-        <pc:sldMkLst>
-          <pc:docMk/>
-          <pc:sldMk cId="4232406185" sldId="263"/>
-        </pc:sldMkLst>
-        <pc:spChg chg="mod">
-          <ac:chgData name="Rob Kuehfus" userId="453d022f19b6df9a" providerId="LiveId" clId="{00300C55-CFA3-4DC3-A480-DB1F7B2B1E1F}" dt="2018-05-31T16:39:37.088" v="15" actId="14"/>
-          <ac:spMkLst>
-            <pc:docMk/>
-            <pc:sldMk cId="4232406185" sldId="263"/>
-            <ac:spMk id="3" creationId="{83B3D083-6DDC-4DF6-842F-2957BF37C439}"/>
-          </ac:spMkLst>
-        </pc:spChg>
-      </pc:sldChg>
-      <pc:sldChg chg="modSp">
-        <pc:chgData name="Rob Kuehfus" userId="453d022f19b6df9a" providerId="LiveId" clId="{00300C55-CFA3-4DC3-A480-DB1F7B2B1E1F}" dt="2018-05-31T20:41:52.057" v="33" actId="20577"/>
-        <pc:sldMkLst>
-          <pc:docMk/>
-          <pc:sldMk cId="1537815153" sldId="265"/>
-        </pc:sldMkLst>
-        <pc:spChg chg="mod">
-          <ac:chgData name="Rob Kuehfus" userId="453d022f19b6df9a" providerId="LiveId" clId="{00300C55-CFA3-4DC3-A480-DB1F7B2B1E1F}" dt="2018-05-31T20:41:52.057" v="33" actId="20577"/>
-          <ac:spMkLst>
-            <pc:docMk/>
-            <pc:sldMk cId="1537815153" sldId="265"/>
-            <ac:spMk id="3" creationId="{FE3E7BEA-002A-4F53-9311-56D273224274}"/>
-          </ac:spMkLst>
-        </pc:spChg>
-      </pc:sldChg>
-    </pc:docChg>
-  </pc:docChgLst>
   <pc:docChgLst>
     <pc:chgData name="Rob Kuehfus" userId="453d022f19b6df9a" providerId="LiveId" clId="{ABE95BDE-6DE9-452F-91A1-74BFF4F3B720}"/>
     <pc:docChg chg="custSel addSld delSld modSld sldOrd">
@@ -517,6 +433,90 @@
       </pc:sldChg>
     </pc:docChg>
   </pc:docChgLst>
+  <pc:docChgLst>
+    <pc:chgData name="Rob Kuehfus" userId="453d022f19b6df9a" providerId="LiveId" clId="{00300C55-CFA3-4DC3-A480-DB1F7B2B1E1F}"/>
+    <pc:docChg chg="custSel modSld">
+      <pc:chgData name="Rob Kuehfus" userId="453d022f19b6df9a" providerId="LiveId" clId="{00300C55-CFA3-4DC3-A480-DB1F7B2B1E1F}" dt="2018-06-01T12:41:30.354" v="123" actId="20577"/>
+      <pc:docMkLst>
+        <pc:docMk/>
+      </pc:docMkLst>
+      <pc:sldChg chg="modSp">
+        <pc:chgData name="Rob Kuehfus" userId="453d022f19b6df9a" providerId="LiveId" clId="{00300C55-CFA3-4DC3-A480-DB1F7B2B1E1F}" dt="2018-05-31T13:18:24.560" v="10" actId="13926"/>
+        <pc:sldMkLst>
+          <pc:docMk/>
+          <pc:sldMk cId="3353185689" sldId="257"/>
+        </pc:sldMkLst>
+        <pc:spChg chg="mod">
+          <ac:chgData name="Rob Kuehfus" userId="453d022f19b6df9a" providerId="LiveId" clId="{00300C55-CFA3-4DC3-A480-DB1F7B2B1E1F}" dt="2018-05-31T13:18:24.560" v="10" actId="13926"/>
+          <ac:spMkLst>
+            <pc:docMk/>
+            <pc:sldMk cId="3353185689" sldId="257"/>
+            <ac:spMk id="3" creationId="{AF88C286-9C1B-475A-8D11-F4C61E9EB7A9}"/>
+          </ac:spMkLst>
+        </pc:spChg>
+      </pc:sldChg>
+      <pc:sldChg chg="modSp">
+        <pc:chgData name="Rob Kuehfus" userId="453d022f19b6df9a" providerId="LiveId" clId="{00300C55-CFA3-4DC3-A480-DB1F7B2B1E1F}" dt="2018-05-31T12:26:38.782" v="9" actId="20577"/>
+        <pc:sldMkLst>
+          <pc:docMk/>
+          <pc:sldMk cId="979064255" sldId="259"/>
+        </pc:sldMkLst>
+        <pc:spChg chg="mod">
+          <ac:chgData name="Rob Kuehfus" userId="453d022f19b6df9a" providerId="LiveId" clId="{00300C55-CFA3-4DC3-A480-DB1F7B2B1E1F}" dt="2018-05-31T12:26:38.782" v="9" actId="20577"/>
+          <ac:spMkLst>
+            <pc:docMk/>
+            <pc:sldMk cId="979064255" sldId="259"/>
+            <ac:spMk id="3" creationId="{E583B256-EB77-4750-A793-27EDE3BD5BA1}"/>
+          </ac:spMkLst>
+        </pc:spChg>
+      </pc:sldChg>
+      <pc:sldChg chg="modSp">
+        <pc:chgData name="Rob Kuehfus" userId="453d022f19b6df9a" providerId="LiveId" clId="{00300C55-CFA3-4DC3-A480-DB1F7B2B1E1F}" dt="2018-06-01T12:41:30.354" v="123" actId="20577"/>
+        <pc:sldMkLst>
+          <pc:docMk/>
+          <pc:sldMk cId="2675988397" sldId="261"/>
+        </pc:sldMkLst>
+        <pc:spChg chg="mod">
+          <ac:chgData name="Rob Kuehfus" userId="453d022f19b6df9a" providerId="LiveId" clId="{00300C55-CFA3-4DC3-A480-DB1F7B2B1E1F}" dt="2018-06-01T12:41:30.354" v="123" actId="20577"/>
+          <ac:spMkLst>
+            <pc:docMk/>
+            <pc:sldMk cId="2675988397" sldId="261"/>
+            <ac:spMk id="3" creationId="{E583B256-EB77-4750-A793-27EDE3BD5BA1}"/>
+          </ac:spMkLst>
+        </pc:spChg>
+      </pc:sldChg>
+      <pc:sldChg chg="modSp">
+        <pc:chgData name="Rob Kuehfus" userId="453d022f19b6df9a" providerId="LiveId" clId="{00300C55-CFA3-4DC3-A480-DB1F7B2B1E1F}" dt="2018-05-31T16:39:37.088" v="15" actId="14"/>
+        <pc:sldMkLst>
+          <pc:docMk/>
+          <pc:sldMk cId="4232406185" sldId="263"/>
+        </pc:sldMkLst>
+        <pc:spChg chg="mod">
+          <ac:chgData name="Rob Kuehfus" userId="453d022f19b6df9a" providerId="LiveId" clId="{00300C55-CFA3-4DC3-A480-DB1F7B2B1E1F}" dt="2018-05-31T16:39:37.088" v="15" actId="14"/>
+          <ac:spMkLst>
+            <pc:docMk/>
+            <pc:sldMk cId="4232406185" sldId="263"/>
+            <ac:spMk id="3" creationId="{83B3D083-6DDC-4DF6-842F-2957BF37C439}"/>
+          </ac:spMkLst>
+        </pc:spChg>
+      </pc:sldChg>
+      <pc:sldChg chg="modSp">
+        <pc:chgData name="Rob Kuehfus" userId="453d022f19b6df9a" providerId="LiveId" clId="{00300C55-CFA3-4DC3-A480-DB1F7B2B1E1F}" dt="2018-05-31T20:41:52.057" v="33" actId="20577"/>
+        <pc:sldMkLst>
+          <pc:docMk/>
+          <pc:sldMk cId="1537815153" sldId="265"/>
+        </pc:sldMkLst>
+        <pc:spChg chg="mod">
+          <ac:chgData name="Rob Kuehfus" userId="453d022f19b6df9a" providerId="LiveId" clId="{00300C55-CFA3-4DC3-A480-DB1F7B2B1E1F}" dt="2018-05-31T20:41:52.057" v="33" actId="20577"/>
+          <ac:spMkLst>
+            <pc:docMk/>
+            <pc:sldMk cId="1537815153" sldId="265"/>
+            <ac:spMk id="3" creationId="{FE3E7BEA-002A-4F53-9311-56D273224274}"/>
+          </ac:spMkLst>
+        </pc:spChg>
+      </pc:sldChg>
+    </pc:docChg>
+  </pc:docChgLst>
 </pc:chgInfo>
 </file>
 
@@ -602,7 +602,7 @@
           <a:p>
             <a:fld id="{53D76E38-EB4B-425D-87E0-B33791D2CD91}" type="datetimeFigureOut">
               <a:rPr lang="en-US" smtClean="0"/>
-              <a:t>6/18/2018</a:t>
+              <a:t>6/20/2018</a:t>
             </a:fld>
             <a:endParaRPr lang="en-US"/>
           </a:p>
@@ -1576,7 +1576,7 @@
           <a:p>
             <a:fld id="{3E3C2F32-47E1-4D90-8C64-89D7BCB0B356}" type="datetimeFigureOut">
               <a:rPr lang="en-US" smtClean="0"/>
-              <a:t>6/18/2018</a:t>
+              <a:t>6/20/2018</a:t>
             </a:fld>
             <a:endParaRPr lang="en-US"/>
           </a:p>
@@ -1774,7 +1774,7 @@
           <a:p>
             <a:fld id="{3E3C2F32-47E1-4D90-8C64-89D7BCB0B356}" type="datetimeFigureOut">
               <a:rPr lang="en-US" smtClean="0"/>
-              <a:t>6/18/2018</a:t>
+              <a:t>6/20/2018</a:t>
             </a:fld>
             <a:endParaRPr lang="en-US"/>
           </a:p>
@@ -1982,7 +1982,7 @@
           <a:p>
             <a:fld id="{3E3C2F32-47E1-4D90-8C64-89D7BCB0B356}" type="datetimeFigureOut">
               <a:rPr lang="en-US" smtClean="0"/>
-              <a:t>6/18/2018</a:t>
+              <a:t>6/20/2018</a:t>
             </a:fld>
             <a:endParaRPr lang="en-US"/>
           </a:p>
@@ -2180,7 +2180,7 @@
           <a:p>
             <a:fld id="{3E3C2F32-47E1-4D90-8C64-89D7BCB0B356}" type="datetimeFigureOut">
               <a:rPr lang="en-US" smtClean="0"/>
-              <a:t>6/18/2018</a:t>
+              <a:t>6/20/2018</a:t>
             </a:fld>
             <a:endParaRPr lang="en-US"/>
           </a:p>
@@ -2455,7 +2455,7 @@
           <a:p>
             <a:fld id="{3E3C2F32-47E1-4D90-8C64-89D7BCB0B356}" type="datetimeFigureOut">
               <a:rPr lang="en-US" smtClean="0"/>
-              <a:t>6/18/2018</a:t>
+              <a:t>6/20/2018</a:t>
             </a:fld>
             <a:endParaRPr lang="en-US"/>
           </a:p>
@@ -2720,7 +2720,7 @@
           <a:p>
             <a:fld id="{3E3C2F32-47E1-4D90-8C64-89D7BCB0B356}" type="datetimeFigureOut">
               <a:rPr lang="en-US" smtClean="0"/>
-              <a:t>6/18/2018</a:t>
+              <a:t>6/20/2018</a:t>
             </a:fld>
             <a:endParaRPr lang="en-US"/>
           </a:p>
@@ -3132,7 +3132,7 @@
           <a:p>
             <a:fld id="{3E3C2F32-47E1-4D90-8C64-89D7BCB0B356}" type="datetimeFigureOut">
               <a:rPr lang="en-US" smtClean="0"/>
-              <a:t>6/18/2018</a:t>
+              <a:t>6/20/2018</a:t>
             </a:fld>
             <a:endParaRPr lang="en-US"/>
           </a:p>
@@ -3273,7 +3273,7 @@
           <a:p>
             <a:fld id="{3E3C2F32-47E1-4D90-8C64-89D7BCB0B356}" type="datetimeFigureOut">
               <a:rPr lang="en-US" smtClean="0"/>
-              <a:t>6/18/2018</a:t>
+              <a:t>6/20/2018</a:t>
             </a:fld>
             <a:endParaRPr lang="en-US"/>
           </a:p>
@@ -3386,7 +3386,7 @@
           <a:p>
             <a:fld id="{3E3C2F32-47E1-4D90-8C64-89D7BCB0B356}" type="datetimeFigureOut">
               <a:rPr lang="en-US" smtClean="0"/>
-              <a:t>6/18/2018</a:t>
+              <a:t>6/20/2018</a:t>
             </a:fld>
             <a:endParaRPr lang="en-US"/>
           </a:p>
@@ -3697,7 +3697,7 @@
           <a:p>
             <a:fld id="{3E3C2F32-47E1-4D90-8C64-89D7BCB0B356}" type="datetimeFigureOut">
               <a:rPr lang="en-US" smtClean="0"/>
-              <a:t>6/18/2018</a:t>
+              <a:t>6/20/2018</a:t>
             </a:fld>
             <a:endParaRPr lang="en-US"/>
           </a:p>
@@ -3985,7 +3985,7 @@
           <a:p>
             <a:fld id="{3E3C2F32-47E1-4D90-8C64-89D7BCB0B356}" type="datetimeFigureOut">
               <a:rPr lang="en-US" smtClean="0"/>
-              <a:t>6/18/2018</a:t>
+              <a:t>6/20/2018</a:t>
             </a:fld>
             <a:endParaRPr lang="en-US"/>
           </a:p>
@@ -4226,7 +4226,7 @@
           <a:p>
             <a:fld id="{3E3C2F32-47E1-4D90-8C64-89D7BCB0B356}" type="datetimeFigureOut">
               <a:rPr lang="en-US" smtClean="0"/>
-              <a:t>6/18/2018</a:t>
+              <a:t>6/20/2018</a:t>
             </a:fld>
             <a:endParaRPr lang="en-US"/>
           </a:p>
@@ -5055,7 +5055,7 @@
                 <a16:creationId xmlns:a16="http://schemas.microsoft.com/office/drawing/2014/main" id="{DB146403-F3D6-484B-B2ED-97F9565D0370}"/>
               </a:ext>
               <a:ext uri="{C183D7F6-B498-43B3-948B-1728B52AA6E4}">
-                <adec:decorative xmlns:adec="http://schemas.microsoft.com/office/drawing/2017/decorative" xmlns="" val="1"/>
+                <adec:decorative xmlns:adec="http://schemas.microsoft.com/office/drawing/2017/decorative" val="1"/>
               </a:ext>
             </a:extLst>
           </p:cNvPr>
@@ -5107,7 +5107,7 @@
                 <a16:creationId xmlns:a16="http://schemas.microsoft.com/office/drawing/2014/main" id="{823AC064-BC96-4F32-8AE1-B2FD38754823}"/>
               </a:ext>
               <a:ext uri="{C183D7F6-B498-43B3-948B-1728B52AA6E4}">
-                <adec:decorative xmlns:adec="http://schemas.microsoft.com/office/drawing/2017/decorative" xmlns="" val="1"/>
+                <adec:decorative xmlns:adec="http://schemas.microsoft.com/office/drawing/2017/decorative" val="1"/>
               </a:ext>
             </a:extLst>
           </p:cNvPr>
@@ -5233,7 +5233,7 @@
                 <a16:creationId xmlns:a16="http://schemas.microsoft.com/office/drawing/2014/main" id="{7E7C77BC-7138-40B1-A15B-20F57A494629}"/>
               </a:ext>
               <a:ext uri="{C183D7F6-B498-43B3-948B-1728B52AA6E4}">
-                <adec:decorative xmlns:adec="http://schemas.microsoft.com/office/drawing/2017/decorative" xmlns="" val="1"/>
+                <adec:decorative xmlns:adec="http://schemas.microsoft.com/office/drawing/2017/decorative" val="1"/>
               </a:ext>
             </a:extLst>
           </p:cNvPr>
@@ -6300,7 +6300,7 @@
                 <a16:creationId xmlns:a16="http://schemas.microsoft.com/office/drawing/2014/main" id="{AB45A142-4255-493C-8284-5D566C121B10}"/>
               </a:ext>
               <a:ext uri="{C183D7F6-B498-43B3-948B-1728B52AA6E4}">
-                <adec:decorative xmlns="" xmlns:adec="http://schemas.microsoft.com/office/drawing/2017/decorative" val="1"/>
+                <adec:decorative xmlns:adec="http://schemas.microsoft.com/office/drawing/2017/decorative" val="1"/>
               </a:ext>
             </a:extLst>
           </p:cNvPr>
@@ -6432,7 +6432,7 @@
                 <a16:creationId xmlns:a16="http://schemas.microsoft.com/office/drawing/2014/main" id="{38FB9660-F42F-4313-BBC4-47C007FE484C}"/>
               </a:ext>
               <a:ext uri="{C183D7F6-B498-43B3-948B-1728B52AA6E4}">
-                <adec:decorative xmlns="" xmlns:adec="http://schemas.microsoft.com/office/drawing/2017/decorative" val="1"/>
+                <adec:decorative xmlns:adec="http://schemas.microsoft.com/office/drawing/2017/decorative" val="1"/>
               </a:ext>
             </a:extLst>
           </p:cNvPr>
@@ -6550,149 +6550,162 @@
             <p:ph idx="1"/>
           </p:nvPr>
         </p:nvSpPr>
-        <p:spPr/>
+        <p:spPr>
+          <a:xfrm>
+            <a:off x="434340" y="1434465"/>
+            <a:ext cx="10919460" cy="5120640"/>
+          </a:xfrm>
+        </p:spPr>
         <p:txBody>
           <a:bodyPr>
-            <a:normAutofit fontScale="62500" lnSpcReduction="20000"/>
+            <a:normAutofit fontScale="92500" lnSpcReduction="20000"/>
           </a:bodyPr>
           <a:lstStyle/>
           <a:p>
             <a:r>
-              <a:rPr lang="en-US" dirty="0"/>
+              <a:rPr lang="en-US" sz="2000" dirty="0"/>
               <a:t>Download and Install </a:t>
             </a:r>
             <a:r>
-              <a:rPr lang="en-US" dirty="0" err="1"/>
+              <a:rPr lang="en-US" sz="2000" dirty="0" err="1"/>
               <a:t>HammerDB</a:t>
             </a:r>
             <a:r>
-              <a:rPr lang="en-US" dirty="0"/>
+              <a:rPr lang="en-US" sz="2000" dirty="0"/>
               <a:t> tool on Visual Studios VM</a:t>
             </a:r>
           </a:p>
           <a:p>
             <a:pPr lvl="1"/>
             <a:r>
-              <a:rPr lang="en-US" dirty="0">
+              <a:rPr lang="en-US" sz="1600" dirty="0">
                 <a:hlinkClick r:id="rId2"/>
               </a:rPr>
               <a:t>www.hammerdb.com</a:t>
             </a:r>
-            <a:endParaRPr lang="en-US" dirty="0"/>
-          </a:p>
-          <a:p>
-            <a:r>
-              <a:rPr lang="en-US" dirty="0"/>
+            <a:endParaRPr lang="en-US" sz="1600" dirty="0"/>
+          </a:p>
+          <a:p>
+            <a:r>
+              <a:rPr lang="en-US" sz="2000" dirty="0"/>
               <a:t>Create a database called “</a:t>
             </a:r>
             <a:r>
-              <a:rPr lang="en-US" dirty="0" err="1"/>
+              <a:rPr lang="en-US" sz="2000" dirty="0" err="1"/>
               <a:t>tpcc</a:t>
             </a:r>
             <a:r>
-              <a:rPr lang="en-US" dirty="0"/>
+              <a:rPr lang="en-US" sz="2000" dirty="0"/>
               <a:t>” on the SQL Server</a:t>
             </a:r>
           </a:p>
           <a:p>
             <a:r>
-              <a:rPr lang="en-US" dirty="0"/>
+              <a:rPr lang="en-US" sz="2000" dirty="0"/>
               <a:t>From Azure Portal, Enable guest-level monitoring on SQL Server</a:t>
             </a:r>
           </a:p>
           <a:p>
             <a:pPr lvl="1"/>
             <a:r>
-              <a:rPr lang="en-US" dirty="0"/>
+              <a:rPr lang="en-US" sz="1600" dirty="0"/>
               <a:t>Add a Performance Counter Metric for </a:t>
             </a:r>
           </a:p>
           <a:p>
             <a:pPr lvl="2"/>
             <a:r>
-              <a:rPr lang="en-US" dirty="0"/>
+              <a:rPr lang="en-US" sz="1400" dirty="0"/>
               <a:t>Object: </a:t>
             </a:r>
             <a:r>
-              <a:rPr lang="en-US" dirty="0" err="1"/>
+              <a:rPr lang="en-US" sz="1400" dirty="0" err="1"/>
               <a:t>SQLServer:Databases</a:t>
             </a:r>
             <a:r>
-              <a:rPr lang="en-US" dirty="0"/>
+              <a:rPr lang="en-US" sz="1400" dirty="0"/>
               <a:t> </a:t>
             </a:r>
           </a:p>
           <a:p>
             <a:pPr lvl="2"/>
             <a:r>
-              <a:rPr lang="en-US" dirty="0"/>
+              <a:rPr lang="en-US" sz="1400" dirty="0"/>
               <a:t>Counter: Active Transactions</a:t>
             </a:r>
           </a:p>
           <a:p>
             <a:pPr lvl="2"/>
             <a:r>
-              <a:rPr lang="en-US" dirty="0" err="1"/>
+              <a:rPr lang="en-US" sz="1400" dirty="0" err="1"/>
               <a:t>Instance:tpcc</a:t>
             </a:r>
-            <a:endParaRPr lang="en-US" dirty="0"/>
+            <a:endParaRPr lang="en-US" sz="1400" dirty="0"/>
           </a:p>
           <a:p>
             <a:pPr lvl="1"/>
             <a:r>
-              <a:rPr lang="en-US" dirty="0"/>
+              <a:rPr lang="en-US" sz="1600" dirty="0"/>
               <a:t>Extra Credit: Update your ARM Template to enable guest-level monitoring on the SQL Server and add a the metric above.</a:t>
             </a:r>
           </a:p>
           <a:p>
             <a:r>
-              <a:rPr lang="en-US" dirty="0"/>
-              <a:t>Start a </a:t>
-            </a:r>
-            <a:r>
-              <a:rPr lang="en-US" dirty="0" err="1"/>
+              <a:rPr lang="en-US" sz="2000" dirty="0"/>
+              <a:t>Use </a:t>
+            </a:r>
+            <a:r>
+              <a:rPr lang="en-US" sz="2000" dirty="0" err="1"/>
               <a:t>HammerDB</a:t>
             </a:r>
             <a:r>
-              <a:rPr lang="en-US" dirty="0"/>
+              <a:rPr lang="en-US" sz="2000" dirty="0"/>
               <a:t> Build to create transactions</a:t>
             </a:r>
           </a:p>
           <a:p>
             <a:r>
-              <a:rPr lang="en-US" dirty="0"/>
-              <a:t>From Azure Monitor, create a graph for the SQL Server Active Transactions and Percent CPU on the same chart and pin to your Azure Dashboard</a:t>
-            </a:r>
-          </a:p>
-          <a:p>
-            <a:r>
-              <a:rPr lang="en-US" dirty="0"/>
+              <a:rPr lang="en-US" sz="2000" dirty="0"/>
+              <a:t>From Azure Monitor, create a graph for the SQL Server Active Transactions and Percent CPU and pin to your Azure Dashboard</a:t>
+            </a:r>
+          </a:p>
+          <a:p>
+            <a:pPr lvl="1"/>
+            <a:r>
+              <a:rPr lang="en-US" sz="1600" dirty="0"/>
               <a:t>From Azure Monitor, create an Action group, to send email to your address</a:t>
             </a:r>
           </a:p>
           <a:p>
-            <a:r>
-              <a:rPr lang="en-US" dirty="0"/>
+            <a:pPr lvl="1"/>
+            <a:r>
+              <a:rPr lang="en-US" sz="1600" dirty="0"/>
               <a:t>Create an Alert if Active Transactions goes over 100 on the SQL Server </a:t>
             </a:r>
             <a:r>
-              <a:rPr lang="en-US" dirty="0" err="1"/>
+              <a:rPr lang="en-US" sz="1600" dirty="0" err="1"/>
               <a:t>tpcc</a:t>
             </a:r>
             <a:r>
-              <a:rPr lang="en-US" dirty="0"/>
+              <a:rPr lang="en-US" sz="1600" dirty="0"/>
               <a:t> database.</a:t>
             </a:r>
           </a:p>
           <a:p>
             <a:r>
-              <a:rPr lang="en-US" dirty="0"/>
-              <a:t>First team to send me an alert wins the challenge!!</a:t>
-            </a:r>
-          </a:p>
-          <a:p>
-            <a:r>
-              <a:rPr lang="en-US" dirty="0"/>
+              <a:rPr lang="en-US" sz="2000" dirty="0"/>
+              <a:t>Create an Alert Rule for CPU over 75% on the Virtual Scale Set that emails me when you go over the threshold.</a:t>
+            </a:r>
+          </a:p>
+          <a:p>
+            <a:r>
+              <a:rPr lang="en-US" sz="2000" dirty="0"/>
+              <a:t>First team to send me both alerts wins the challenge!!</a:t>
+            </a:r>
+          </a:p>
+          <a:p>
+            <a:r>
+              <a:rPr lang="en-US" sz="2000" dirty="0"/>
               <a:t>Good luck!</a:t>
             </a:r>
           </a:p>
@@ -6775,7 +6788,7 @@
         <p:spPr/>
         <p:txBody>
           <a:bodyPr>
-            <a:normAutofit fontScale="85000" lnSpcReduction="10000"/>
+            <a:normAutofit fontScale="85000" lnSpcReduction="20000"/>
           </a:bodyPr>
           <a:lstStyle/>
           <a:p>
@@ -6822,7 +6835,7 @@
           <a:p>
             <a:r>
               <a:rPr lang="en-US" dirty="0"/>
-              <a:t>Deploy Service Map agents to Web and SQL Servers</a:t>
+              <a:t>Deploy Service Map agents to Web Scale Set VMs and SQL Servers</a:t>
             </a:r>
           </a:p>
           <a:p>
@@ -6836,13 +6849,21 @@
             <a:pPr lvl="1"/>
             <a:r>
               <a:rPr lang="en-US" dirty="0"/>
-              <a:t>Generate load on the SQL Server and view the results in Service Map</a:t>
-            </a:r>
-          </a:p>
-          <a:p>
-            <a:r>
-              <a:rPr lang="en-US" dirty="0"/>
-              <a:t>First Team to email me a screenshot with your VS VM being detected by Service Map wins the challenge.  Good luck!</a:t>
+              <a:t>Generate DB load using </a:t>
+            </a:r>
+            <a:r>
+              <a:rPr lang="en-US" dirty="0" err="1"/>
+              <a:t>HammerDB</a:t>
+            </a:r>
+            <a:r>
+              <a:rPr lang="en-US" dirty="0"/>
+              <a:t> from the Visual Studio Server and view the results in Service Map</a:t>
+            </a:r>
+          </a:p>
+          <a:p>
+            <a:r>
+              <a:rPr lang="en-US" dirty="0"/>
+              <a:t>First Team to email me a screenshot with the Visual Studio Server detected by your Scale Set and detected by Service Map wins the challenge.  Good luck!</a:t>
             </a:r>
           </a:p>
           <a:p>

</xml_diff>

<commit_message>
Add Azure Monitor Automation Challenge
</commit_message>
<xml_diff>
--- a/decks/Azure Monitoring Hackathon.pptx
+++ b/decks/Azure Monitoring Hackathon.pptx
@@ -5,7 +5,7 @@
     <p:sldMasterId id="2147483648" r:id="rId1"/>
   </p:sldMasterIdLst>
   <p:notesMasterIdLst>
-    <p:notesMasterId r:id="rId16"/>
+    <p:notesMasterId r:id="rId17"/>
   </p:notesMasterIdLst>
   <p:sldIdLst>
     <p:sldId id="256" r:id="rId2"/>
@@ -15,13 +15,14 @@
     <p:sldId id="257" r:id="rId6"/>
     <p:sldId id="258" r:id="rId7"/>
     <p:sldId id="262" r:id="rId8"/>
-    <p:sldId id="263" r:id="rId9"/>
-    <p:sldId id="264" r:id="rId10"/>
-    <p:sldId id="266" r:id="rId11"/>
-    <p:sldId id="269" r:id="rId12"/>
-    <p:sldId id="268" r:id="rId13"/>
-    <p:sldId id="265" r:id="rId14"/>
-    <p:sldId id="267" r:id="rId15"/>
+    <p:sldId id="270" r:id="rId9"/>
+    <p:sldId id="263" r:id="rId10"/>
+    <p:sldId id="264" r:id="rId11"/>
+    <p:sldId id="266" r:id="rId12"/>
+    <p:sldId id="269" r:id="rId13"/>
+    <p:sldId id="268" r:id="rId14"/>
+    <p:sldId id="265" r:id="rId15"/>
+    <p:sldId id="267" r:id="rId16"/>
   </p:sldIdLst>
   <p:sldSz cx="12192000" cy="6858000"/>
   <p:notesSz cx="6858000" cy="9144000"/>
@@ -602,7 +603,7 @@
           <a:p>
             <a:fld id="{53D76E38-EB4B-425D-87E0-B33791D2CD91}" type="datetimeFigureOut">
               <a:rPr lang="en-US" smtClean="0"/>
-              <a:t>6/20/2018</a:t>
+              <a:t>9/25/2018</a:t>
             </a:fld>
             <a:endParaRPr lang="en-US"/>
           </a:p>
@@ -1078,7 +1079,7 @@
           <a:p>
             <a:fld id="{D1ABA2CB-342C-46F9-95EC-88F4F68DF547}" type="slidenum">
               <a:rPr lang="en-US" smtClean="0"/>
-              <a:t>13</a:t>
+              <a:t>14</a:t>
             </a:fld>
             <a:endParaRPr lang="en-US"/>
           </a:p>
@@ -1410,7 +1411,7 @@
           <a:p>
             <a:fld id="{D1ABA2CB-342C-46F9-95EC-88F4F68DF547}" type="slidenum">
               <a:rPr lang="en-US" smtClean="0"/>
-              <a:t>14</a:t>
+              <a:t>15</a:t>
             </a:fld>
             <a:endParaRPr lang="en-US"/>
           </a:p>
@@ -1576,7 +1577,7 @@
           <a:p>
             <a:fld id="{3E3C2F32-47E1-4D90-8C64-89D7BCB0B356}" type="datetimeFigureOut">
               <a:rPr lang="en-US" smtClean="0"/>
-              <a:t>6/20/2018</a:t>
+              <a:t>9/25/2018</a:t>
             </a:fld>
             <a:endParaRPr lang="en-US"/>
           </a:p>
@@ -1774,7 +1775,7 @@
           <a:p>
             <a:fld id="{3E3C2F32-47E1-4D90-8C64-89D7BCB0B356}" type="datetimeFigureOut">
               <a:rPr lang="en-US" smtClean="0"/>
-              <a:t>6/20/2018</a:t>
+              <a:t>9/25/2018</a:t>
             </a:fld>
             <a:endParaRPr lang="en-US"/>
           </a:p>
@@ -1982,7 +1983,7 @@
           <a:p>
             <a:fld id="{3E3C2F32-47E1-4D90-8C64-89D7BCB0B356}" type="datetimeFigureOut">
               <a:rPr lang="en-US" smtClean="0"/>
-              <a:t>6/20/2018</a:t>
+              <a:t>9/25/2018</a:t>
             </a:fld>
             <a:endParaRPr lang="en-US"/>
           </a:p>
@@ -2180,7 +2181,7 @@
           <a:p>
             <a:fld id="{3E3C2F32-47E1-4D90-8C64-89D7BCB0B356}" type="datetimeFigureOut">
               <a:rPr lang="en-US" smtClean="0"/>
-              <a:t>6/20/2018</a:t>
+              <a:t>9/25/2018</a:t>
             </a:fld>
             <a:endParaRPr lang="en-US"/>
           </a:p>
@@ -2455,7 +2456,7 @@
           <a:p>
             <a:fld id="{3E3C2F32-47E1-4D90-8C64-89D7BCB0B356}" type="datetimeFigureOut">
               <a:rPr lang="en-US" smtClean="0"/>
-              <a:t>6/20/2018</a:t>
+              <a:t>9/25/2018</a:t>
             </a:fld>
             <a:endParaRPr lang="en-US"/>
           </a:p>
@@ -2720,7 +2721,7 @@
           <a:p>
             <a:fld id="{3E3C2F32-47E1-4D90-8C64-89D7BCB0B356}" type="datetimeFigureOut">
               <a:rPr lang="en-US" smtClean="0"/>
-              <a:t>6/20/2018</a:t>
+              <a:t>9/25/2018</a:t>
             </a:fld>
             <a:endParaRPr lang="en-US"/>
           </a:p>
@@ -3132,7 +3133,7 @@
           <a:p>
             <a:fld id="{3E3C2F32-47E1-4D90-8C64-89D7BCB0B356}" type="datetimeFigureOut">
               <a:rPr lang="en-US" smtClean="0"/>
-              <a:t>6/20/2018</a:t>
+              <a:t>9/25/2018</a:t>
             </a:fld>
             <a:endParaRPr lang="en-US"/>
           </a:p>
@@ -3273,7 +3274,7 @@
           <a:p>
             <a:fld id="{3E3C2F32-47E1-4D90-8C64-89D7BCB0B356}" type="datetimeFigureOut">
               <a:rPr lang="en-US" smtClean="0"/>
-              <a:t>6/20/2018</a:t>
+              <a:t>9/25/2018</a:t>
             </a:fld>
             <a:endParaRPr lang="en-US"/>
           </a:p>
@@ -3386,7 +3387,7 @@
           <a:p>
             <a:fld id="{3E3C2F32-47E1-4D90-8C64-89D7BCB0B356}" type="datetimeFigureOut">
               <a:rPr lang="en-US" smtClean="0"/>
-              <a:t>6/20/2018</a:t>
+              <a:t>9/25/2018</a:t>
             </a:fld>
             <a:endParaRPr lang="en-US"/>
           </a:p>
@@ -3697,7 +3698,7 @@
           <a:p>
             <a:fld id="{3E3C2F32-47E1-4D90-8C64-89D7BCB0B356}" type="datetimeFigureOut">
               <a:rPr lang="en-US" smtClean="0"/>
-              <a:t>6/20/2018</a:t>
+              <a:t>9/25/2018</a:t>
             </a:fld>
             <a:endParaRPr lang="en-US"/>
           </a:p>
@@ -3985,7 +3986,7 @@
           <a:p>
             <a:fld id="{3E3C2F32-47E1-4D90-8C64-89D7BCB0B356}" type="datetimeFigureOut">
               <a:rPr lang="en-US" smtClean="0"/>
-              <a:t>6/20/2018</a:t>
+              <a:t>9/25/2018</a:t>
             </a:fld>
             <a:endParaRPr lang="en-US"/>
           </a:p>
@@ -4226,7 +4227,7 @@
           <a:p>
             <a:fld id="{3E3C2F32-47E1-4D90-8C64-89D7BCB0B356}" type="datetimeFigureOut">
               <a:rPr lang="en-US" smtClean="0"/>
-              <a:t>6/20/2018</a:t>
+              <a:t>9/25/2018</a:t>
             </a:fld>
             <a:endParaRPr lang="en-US"/>
           </a:p>
@@ -4734,7 +4735,7 @@
           <p:cNvPr id="2" name="Title 1">
             <a:extLst>
               <a:ext uri="{FF2B5EF4-FFF2-40B4-BE49-F238E27FC236}">
-                <a16:creationId xmlns:a16="http://schemas.microsoft.com/office/drawing/2014/main" id="{DF07F779-9493-43B4-B2B0-F6812A193792}"/>
+                <a16:creationId xmlns:a16="http://schemas.microsoft.com/office/drawing/2014/main" id="{9103BE6A-C3F7-45A9-AAB2-2D815440BC0A}"/>
               </a:ext>
             </a:extLst>
           </p:cNvPr>
@@ -4752,7 +4753,7 @@
           <a:p>
             <a:r>
               <a:rPr lang="en-US" dirty="0"/>
-              <a:t>Application Insights Challenges</a:t>
+              <a:t>Log Analytics Dashboard Challenge</a:t>
             </a:r>
           </a:p>
         </p:txBody>
@@ -4762,7 +4763,7 @@
           <p:cNvPr id="3" name="Content Placeholder 2">
             <a:extLst>
               <a:ext uri="{FF2B5EF4-FFF2-40B4-BE49-F238E27FC236}">
-                <a16:creationId xmlns:a16="http://schemas.microsoft.com/office/drawing/2014/main" id="{1E78601A-55E5-4C27-BA46-67A384908580}"/>
+                <a16:creationId xmlns:a16="http://schemas.microsoft.com/office/drawing/2014/main" id="{83B3D083-6DDC-4DF6-842F-2957BF37C439}"/>
               </a:ext>
             </a:extLst>
           </p:cNvPr>
@@ -4776,149 +4777,88 @@
         <p:spPr/>
         <p:txBody>
           <a:bodyPr>
-            <a:normAutofit fontScale="85000" lnSpcReduction="20000"/>
+            <a:normAutofit fontScale="92500" lnSpcReduction="20000"/>
           </a:bodyPr>
           <a:lstStyle/>
           <a:p>
             <a:r>
               <a:rPr lang="en-US" dirty="0"/>
-              <a:t>Create an Application Insights Workspace</a:t>
-            </a:r>
-          </a:p>
-          <a:p>
-            <a:r>
-              <a:rPr lang="en-US" dirty="0"/>
-              <a:t>In Visual Studio, Install the Application Insights SDK in the </a:t>
+              <a:t>Write Custom Performance queries for Web and SQL Servers and save to favorites</a:t>
+            </a:r>
+          </a:p>
+          <a:p>
+            <a:pPr lvl="1"/>
+            <a:r>
+              <a:rPr lang="en-US" dirty="0"/>
+              <a:t>Processor Utilization: Processor / % Processor Time</a:t>
+            </a:r>
+          </a:p>
+          <a:p>
+            <a:pPr lvl="1"/>
+            <a:r>
+              <a:rPr lang="en-US" dirty="0"/>
+              <a:t>Memory Utilization: Memory / % Committed Bytes In Use</a:t>
+            </a:r>
+          </a:p>
+          <a:p>
+            <a:pPr lvl="1"/>
+            <a:r>
+              <a:rPr lang="en-US" dirty="0"/>
+              <a:t>Disk Utilization (IO): Disk Reads/sec and Disk Writes/sec</a:t>
+            </a:r>
+          </a:p>
+          <a:p>
+            <a:r>
+              <a:rPr lang="en-US" dirty="0"/>
+              <a:t>Render the queries in a </a:t>
             </a:r>
             <a:r>
               <a:rPr lang="en-US" dirty="0" err="1"/>
-              <a:t>eShopOnWeb</a:t>
-            </a:r>
-            <a:r>
-              <a:rPr lang="en-US" dirty="0"/>
-              <a:t> Web Project in the Solution</a:t>
+              <a:t>timechart</a:t>
+            </a:r>
+            <a:r>
+              <a:rPr lang="en-US" dirty="0"/>
+              <a:t> for the last 4 hours and save to favorites</a:t>
+            </a:r>
+          </a:p>
+          <a:p>
+            <a:r>
+              <a:rPr lang="en-US" dirty="0"/>
+              <a:t>Create a heartbeat query for Web and SQL Server</a:t>
+            </a:r>
+          </a:p>
+          <a:p>
+            <a:r>
+              <a:rPr lang="en-US" dirty="0"/>
+              <a:t>Create a Log Analytics Solution </a:t>
             </a:r>
           </a:p>
           <a:p>
             <a:pPr lvl="1"/>
             <a:r>
               <a:rPr lang="en-US" dirty="0"/>
-              <a:t>Run the </a:t>
-            </a:r>
-            <a:r>
-              <a:rPr lang="en-US" dirty="0" err="1"/>
-              <a:t>eShopOnWeb</a:t>
-            </a:r>
-            <a:r>
-              <a:rPr lang="en-US" dirty="0"/>
-              <a:t>  Web project and check out the App Insights tooling</a:t>
+              <a:t>Use your heartbeat query for the Overview tile</a:t>
             </a:r>
           </a:p>
           <a:p>
             <a:pPr lvl="1"/>
             <a:r>
               <a:rPr lang="en-US" dirty="0"/>
-              <a:t>Publish </a:t>
-            </a:r>
-            <a:r>
-              <a:rPr lang="en-US" dirty="0" err="1"/>
-              <a:t>eShopOnWeb</a:t>
-            </a:r>
-            <a:r>
-              <a:rPr lang="en-US" dirty="0"/>
-              <a:t>  Web project to both Web Servers in the </a:t>
-            </a:r>
-            <a:r>
-              <a:rPr lang="en-US" dirty="0" err="1"/>
-              <a:t>scaleset</a:t>
-            </a:r>
+              <a:t>Use your performance queries to create a line chart &amp; list for Processor, Memory and Disk (Reads &amp; Writes).</a:t>
+            </a:r>
+          </a:p>
+          <a:p>
+            <a:r>
+              <a:rPr lang="en-US" dirty="0"/>
+              <a:t>First Team to email me a screenshot with your Solution wins the challenge.  Good luck!</a:t>
+            </a:r>
+          </a:p>
+          <a:p>
+            <a:pPr lvl="1"/>
             <a:endParaRPr lang="en-US" dirty="0"/>
           </a:p>
           <a:p>
-            <a:r>
-              <a:rPr lang="en-US" dirty="0"/>
-              <a:t>Create a URL Ping test targeting the </a:t>
-            </a:r>
-            <a:r>
-              <a:rPr lang="en-US" dirty="0" err="1"/>
-              <a:t>eShopOnWeb</a:t>
-            </a:r>
-            <a:r>
-              <a:rPr lang="en-US" dirty="0"/>
-              <a:t> URL to Monitor Availability</a:t>
-            </a:r>
-          </a:p>
-          <a:p>
             <a:pPr lvl="1"/>
-            <a:r>
-              <a:rPr lang="en-US" dirty="0"/>
-              <a:t>Generate some load and check out the results</a:t>
-            </a:r>
-          </a:p>
-          <a:p>
-            <a:r>
-              <a:rPr lang="en-US" dirty="0"/>
-              <a:t>Create a </a:t>
-            </a:r>
-            <a:r>
-              <a:rPr lang="en-US" dirty="0" err="1"/>
-              <a:t>autoscale</a:t>
-            </a:r>
-            <a:r>
-              <a:rPr lang="en-US" dirty="0"/>
-              <a:t> rule on your </a:t>
-            </a:r>
-            <a:r>
-              <a:rPr lang="en-US" dirty="0" err="1"/>
-              <a:t>scaleset</a:t>
-            </a:r>
-            <a:r>
-              <a:rPr lang="en-US" dirty="0"/>
-              <a:t> based on the session count metric</a:t>
-            </a:r>
-          </a:p>
-          <a:p>
-            <a:r>
-              <a:rPr lang="en-US" dirty="0"/>
-              <a:t>Trip the exception that has been added and setup an alert for it.</a:t>
-            </a:r>
-          </a:p>
-          <a:p>
-            <a:pPr lvl="1"/>
-            <a:r>
-              <a:rPr lang="en-US" dirty="0"/>
-              <a:t>Find the exception in App Insights</a:t>
-            </a:r>
-          </a:p>
-          <a:p>
-            <a:r>
-              <a:rPr lang="en-US" dirty="0"/>
-              <a:t> Create Alerts based on Availability and exceptions</a:t>
-            </a:r>
-          </a:p>
-          <a:p>
-            <a:r>
-              <a:rPr lang="en-US" dirty="0"/>
-              <a:t>First Team to email me an alert of the exception and a screenshot with your </a:t>
-            </a:r>
-            <a:r>
-              <a:rPr lang="en-US" dirty="0" err="1"/>
-              <a:t>scaleset</a:t>
-            </a:r>
-            <a:r>
-              <a:rPr lang="en-US" dirty="0"/>
-              <a:t> </a:t>
-            </a:r>
-            <a:r>
-              <a:rPr lang="en-US" dirty="0" err="1"/>
-              <a:t>scaleout</a:t>
-            </a:r>
-            <a:r>
-              <a:rPr lang="en-US" dirty="0"/>
-              <a:t> based on the App Insights metric wins the challenge.  Good luck</a:t>
-            </a:r>
-          </a:p>
-          <a:p>
             <a:endParaRPr lang="en-US" dirty="0"/>
           </a:p>
           <a:p>
@@ -4929,7 +4869,7 @@
     </p:spTree>
     <p:extLst>
       <p:ext uri="{BB962C8B-B14F-4D97-AF65-F5344CB8AC3E}">
-        <p14:creationId xmlns:p14="http://schemas.microsoft.com/office/powerpoint/2010/main" val="3119135505"/>
+        <p14:creationId xmlns:p14="http://schemas.microsoft.com/office/powerpoint/2010/main" val="340413092"/>
       </p:ext>
     </p:extLst>
   </p:cSld>
@@ -4958,10 +4898,10 @@
       </p:grpSpPr>
       <p:sp>
         <p:nvSpPr>
-          <p:cNvPr id="4" name="Title 3">
-            <a:extLst>
-              <a:ext uri="{FF2B5EF4-FFF2-40B4-BE49-F238E27FC236}">
-                <a16:creationId xmlns:a16="http://schemas.microsoft.com/office/drawing/2014/main" id="{CD138661-B7C5-4927-843B-13B9D076E75A}"/>
+          <p:cNvPr id="2" name="Title 1">
+            <a:extLst>
+              <a:ext uri="{FF2B5EF4-FFF2-40B4-BE49-F238E27FC236}">
+                <a16:creationId xmlns:a16="http://schemas.microsoft.com/office/drawing/2014/main" id="{DF07F779-9493-43B4-B2B0-F6812A193792}"/>
               </a:ext>
             </a:extLst>
           </p:cNvPr>
@@ -4979,31 +4919,175 @@
           <a:p>
             <a:r>
               <a:rPr lang="en-US" dirty="0"/>
-              <a:t>Reference  </a:t>
-            </a:r>
-          </a:p>
-        </p:txBody>
-      </p:sp>
-      <p:sp>
-        <p:nvSpPr>
-          <p:cNvPr id="5" name="Text Placeholder 4">
-            <a:extLst>
-              <a:ext uri="{FF2B5EF4-FFF2-40B4-BE49-F238E27FC236}">
-                <a16:creationId xmlns:a16="http://schemas.microsoft.com/office/drawing/2014/main" id="{B3E993D0-F947-4952-8D6A-754E76C7C98F}"/>
-              </a:ext>
-            </a:extLst>
-          </p:cNvPr>
-          <p:cNvSpPr>
-            <a:spLocks noGrp="1"/>
-          </p:cNvSpPr>
-          <p:nvPr>
-            <p:ph type="body" idx="1"/>
+              <a:t>Application Insights Challenges</a:t>
+            </a:r>
+          </a:p>
+        </p:txBody>
+      </p:sp>
+      <p:sp>
+        <p:nvSpPr>
+          <p:cNvPr id="3" name="Content Placeholder 2">
+            <a:extLst>
+              <a:ext uri="{FF2B5EF4-FFF2-40B4-BE49-F238E27FC236}">
+                <a16:creationId xmlns:a16="http://schemas.microsoft.com/office/drawing/2014/main" id="{1E78601A-55E5-4C27-BA46-67A384908580}"/>
+              </a:ext>
+            </a:extLst>
+          </p:cNvPr>
+          <p:cNvSpPr>
+            <a:spLocks noGrp="1"/>
+          </p:cNvSpPr>
+          <p:nvPr>
+            <p:ph idx="1"/>
           </p:nvPr>
         </p:nvSpPr>
         <p:spPr/>
         <p:txBody>
-          <a:bodyPr/>
-          <a:lstStyle/>
+          <a:bodyPr>
+            <a:normAutofit fontScale="85000" lnSpcReduction="20000"/>
+          </a:bodyPr>
+          <a:lstStyle/>
+          <a:p>
+            <a:r>
+              <a:rPr lang="en-US" dirty="0"/>
+              <a:t>Create an Application Insights Workspace</a:t>
+            </a:r>
+          </a:p>
+          <a:p>
+            <a:r>
+              <a:rPr lang="en-US" dirty="0"/>
+              <a:t>In Visual Studio, Install the Application Insights SDK in the </a:t>
+            </a:r>
+            <a:r>
+              <a:rPr lang="en-US" dirty="0" err="1"/>
+              <a:t>eShopOnWeb</a:t>
+            </a:r>
+            <a:r>
+              <a:rPr lang="en-US" dirty="0"/>
+              <a:t> Web Project in the Solution</a:t>
+            </a:r>
+          </a:p>
+          <a:p>
+            <a:pPr lvl="1"/>
+            <a:r>
+              <a:rPr lang="en-US" dirty="0"/>
+              <a:t>Run the </a:t>
+            </a:r>
+            <a:r>
+              <a:rPr lang="en-US" dirty="0" err="1"/>
+              <a:t>eShopOnWeb</a:t>
+            </a:r>
+            <a:r>
+              <a:rPr lang="en-US" dirty="0"/>
+              <a:t>  Web project and check out the App Insights tooling</a:t>
+            </a:r>
+          </a:p>
+          <a:p>
+            <a:pPr lvl="1"/>
+            <a:r>
+              <a:rPr lang="en-US" dirty="0"/>
+              <a:t>Publish </a:t>
+            </a:r>
+            <a:r>
+              <a:rPr lang="en-US" dirty="0" err="1"/>
+              <a:t>eShopOnWeb</a:t>
+            </a:r>
+            <a:r>
+              <a:rPr lang="en-US" dirty="0"/>
+              <a:t>  Web project to both Web Servers in the </a:t>
+            </a:r>
+            <a:r>
+              <a:rPr lang="en-US" dirty="0" err="1"/>
+              <a:t>scaleset</a:t>
+            </a:r>
+            <a:endParaRPr lang="en-US" dirty="0"/>
+          </a:p>
+          <a:p>
+            <a:r>
+              <a:rPr lang="en-US" dirty="0"/>
+              <a:t>Create a URL Ping test targeting the </a:t>
+            </a:r>
+            <a:r>
+              <a:rPr lang="en-US" dirty="0" err="1"/>
+              <a:t>eShopOnWeb</a:t>
+            </a:r>
+            <a:r>
+              <a:rPr lang="en-US" dirty="0"/>
+              <a:t> URL to Monitor Availability</a:t>
+            </a:r>
+          </a:p>
+          <a:p>
+            <a:pPr lvl="1"/>
+            <a:r>
+              <a:rPr lang="en-US" dirty="0"/>
+              <a:t>Generate some load and check out the results</a:t>
+            </a:r>
+          </a:p>
+          <a:p>
+            <a:r>
+              <a:rPr lang="en-US" dirty="0"/>
+              <a:t>Create a </a:t>
+            </a:r>
+            <a:r>
+              <a:rPr lang="en-US" dirty="0" err="1"/>
+              <a:t>autoscale</a:t>
+            </a:r>
+            <a:r>
+              <a:rPr lang="en-US" dirty="0"/>
+              <a:t> rule on your </a:t>
+            </a:r>
+            <a:r>
+              <a:rPr lang="en-US" dirty="0" err="1"/>
+              <a:t>scaleset</a:t>
+            </a:r>
+            <a:r>
+              <a:rPr lang="en-US" dirty="0"/>
+              <a:t> based on the session count metric</a:t>
+            </a:r>
+          </a:p>
+          <a:p>
+            <a:r>
+              <a:rPr lang="en-US" dirty="0"/>
+              <a:t>Trip the exception that has been added and setup an alert for it.</a:t>
+            </a:r>
+          </a:p>
+          <a:p>
+            <a:pPr lvl="1"/>
+            <a:r>
+              <a:rPr lang="en-US" dirty="0"/>
+              <a:t>Find the exception in App Insights</a:t>
+            </a:r>
+          </a:p>
+          <a:p>
+            <a:r>
+              <a:rPr lang="en-US" dirty="0"/>
+              <a:t> Create Alerts based on Availability and exceptions</a:t>
+            </a:r>
+          </a:p>
+          <a:p>
+            <a:r>
+              <a:rPr lang="en-US" dirty="0"/>
+              <a:t>First Team to email me an alert of the exception and a screenshot with your </a:t>
+            </a:r>
+            <a:r>
+              <a:rPr lang="en-US" dirty="0" err="1"/>
+              <a:t>scaleset</a:t>
+            </a:r>
+            <a:r>
+              <a:rPr lang="en-US" dirty="0"/>
+              <a:t> </a:t>
+            </a:r>
+            <a:r>
+              <a:rPr lang="en-US" dirty="0" err="1"/>
+              <a:t>scaleout</a:t>
+            </a:r>
+            <a:r>
+              <a:rPr lang="en-US" dirty="0"/>
+              <a:t> based on the App Insights metric wins the challenge.  Good luck</a:t>
+            </a:r>
+          </a:p>
+          <a:p>
+            <a:endParaRPr lang="en-US" dirty="0"/>
+          </a:p>
           <a:p>
             <a:endParaRPr lang="en-US" dirty="0"/>
           </a:p>
@@ -5012,7 +5096,7 @@
     </p:spTree>
     <p:extLst>
       <p:ext uri="{BB962C8B-B14F-4D97-AF65-F5344CB8AC3E}">
-        <p14:creationId xmlns:p14="http://schemas.microsoft.com/office/powerpoint/2010/main" val="1924108191"/>
+        <p14:creationId xmlns:p14="http://schemas.microsoft.com/office/powerpoint/2010/main" val="3119135505"/>
       </p:ext>
     </p:extLst>
   </p:cSld>
@@ -5025,14 +5109,6 @@
 <file path=ppt/slides/slide12.xml><?xml version="1.0" encoding="utf-8"?>
 <p:sld xmlns:a="http://schemas.openxmlformats.org/drawingml/2006/main" xmlns:r="http://schemas.openxmlformats.org/officeDocument/2006/relationships" xmlns:p="http://schemas.openxmlformats.org/presentationml/2006/main">
   <p:cSld>
-    <p:bg>
-      <p:bgPr>
-        <a:solidFill>
-          <a:schemeClr val="bg1"/>
-        </a:solidFill>
-        <a:effectLst/>
-      </p:bgPr>
-    </p:bg>
     <p:spTree>
       <p:nvGrpSpPr>
         <p:cNvPr id="1" name=""/>
@@ -5047,242 +5123,12 @@
           <a:chExt cx="0" cy="0"/>
         </a:xfrm>
       </p:grpSpPr>
-      <p:cxnSp>
-        <p:nvCxnSpPr>
-          <p:cNvPr id="10" name="Straight Connector 9">
-            <a:extLst>
-              <a:ext uri="{FF2B5EF4-FFF2-40B4-BE49-F238E27FC236}">
-                <a16:creationId xmlns:a16="http://schemas.microsoft.com/office/drawing/2014/main" id="{DB146403-F3D6-484B-B2ED-97F9565D0370}"/>
-              </a:ext>
-              <a:ext uri="{C183D7F6-B498-43B3-948B-1728B52AA6E4}">
-                <adec:decorative xmlns:adec="http://schemas.microsoft.com/office/drawing/2017/decorative" val="1"/>
-              </a:ext>
-            </a:extLst>
-          </p:cNvPr>
-          <p:cNvCxnSpPr>
-            <a:cxnSpLocks noGrp="1" noRot="1" noChangeAspect="1" noMove="1" noResize="1" noEditPoints="1" noAdjustHandles="1" noChangeArrowheads="1" noChangeShapeType="1"/>
-          </p:cNvCxnSpPr>
-          <p:nvPr>
-            <p:extLst>
-              <p:ext uri="{386F3935-93C4-4BCD-93E2-E3B085C9AB24}">
-                <p16:designElem xmlns:p16="http://schemas.microsoft.com/office/powerpoint/2015/main" val="1"/>
-              </p:ext>
-            </p:extLst>
-          </p:nvPr>
-        </p:nvCxnSpPr>
-        <p:spPr>
-          <a:xfrm>
-            <a:off x="6096000" y="477749"/>
-            <a:ext cx="0" cy="3657600"/>
-          </a:xfrm>
-          <a:prstGeom prst="line">
-            <a:avLst/>
-          </a:prstGeom>
-          <a:ln w="101600" cmpd="dbl">
-            <a:solidFill>
-              <a:srgbClr val="595959"/>
-            </a:solidFill>
-          </a:ln>
-        </p:spPr>
-        <p:style>
-          <a:lnRef idx="1">
-            <a:schemeClr val="accent1"/>
-          </a:lnRef>
-          <a:fillRef idx="0">
-            <a:schemeClr val="accent1"/>
-          </a:fillRef>
-          <a:effectRef idx="0">
-            <a:schemeClr val="accent1"/>
-          </a:effectRef>
-          <a:fontRef idx="minor">
-            <a:schemeClr val="tx1"/>
-          </a:fontRef>
-        </p:style>
-      </p:cxnSp>
-      <p:sp>
-        <p:nvSpPr>
-          <p:cNvPr id="12" name="Rectangle 11">
-            <a:extLst>
-              <a:ext uri="{FF2B5EF4-FFF2-40B4-BE49-F238E27FC236}">
-                <a16:creationId xmlns:a16="http://schemas.microsoft.com/office/drawing/2014/main" id="{823AC064-BC96-4F32-8AE1-B2FD38754823}"/>
-              </a:ext>
-              <a:ext uri="{C183D7F6-B498-43B3-948B-1728B52AA6E4}">
-                <adec:decorative xmlns:adec="http://schemas.microsoft.com/office/drawing/2017/decorative" val="1"/>
-              </a:ext>
-            </a:extLst>
-          </p:cNvPr>
-          <p:cNvSpPr>
-            <a:spLocks noGrp="1" noRot="1" noChangeAspect="1" noMove="1" noResize="1" noEditPoints="1" noAdjustHandles="1" noChangeArrowheads="1" noChangeShapeType="1" noTextEdit="1"/>
-          </p:cNvSpPr>
-          <p:nvPr>
-            <p:extLst>
-              <p:ext uri="{386F3935-93C4-4BCD-93E2-E3B085C9AB24}">
-                <p16:designElem xmlns:p16="http://schemas.microsoft.com/office/powerpoint/2015/main" val="1"/>
-              </p:ext>
-            </p:extLst>
-          </p:nvPr>
-        </p:nvSpPr>
-        <p:spPr bwMode="ltGray">
-          <a:xfrm>
-            <a:off x="378068" y="4633546"/>
-            <a:ext cx="11438793" cy="1844256"/>
-          </a:xfrm>
-          <a:prstGeom prst="rect">
-            <a:avLst/>
-          </a:prstGeom>
-          <a:solidFill>
-            <a:srgbClr val="404040"/>
-          </a:solidFill>
-          <a:ln w="127000" cap="sq" cmpd="thinThick">
-            <a:solidFill>
-              <a:srgbClr val="404040"/>
-            </a:solidFill>
-          </a:ln>
-        </p:spPr>
-        <p:style>
-          <a:lnRef idx="2">
-            <a:schemeClr val="accent1">
-              <a:shade val="50000"/>
-            </a:schemeClr>
-          </a:lnRef>
-          <a:fillRef idx="1">
-            <a:schemeClr val="accent1"/>
-          </a:fillRef>
-          <a:effectRef idx="0">
-            <a:schemeClr val="accent1"/>
-          </a:effectRef>
-          <a:fontRef idx="minor">
-            <a:schemeClr val="lt1"/>
-          </a:fontRef>
-        </p:style>
-        <p:txBody>
-          <a:bodyPr rtlCol="0" anchor="ctr"/>
-          <a:lstStyle/>
-          <a:p>
-            <a:pPr marL="0" marR="0" lvl="0" indent="0" algn="ctr" defTabSz="914400" rtl="0" eaLnBrk="1" fontAlgn="auto" latinLnBrk="0" hangingPunct="1">
-              <a:lnSpc>
-                <a:spcPct val="100000"/>
-              </a:lnSpc>
-              <a:spcBef>
-                <a:spcPts val="0"/>
-              </a:spcBef>
-              <a:spcAft>
-                <a:spcPts val="0"/>
-              </a:spcAft>
-              <a:buClrTx/>
-              <a:buSzTx/>
-              <a:buFontTx/>
-              <a:buNone/>
-              <a:tabLst/>
-              <a:defRPr/>
-            </a:pPr>
-            <a:endParaRPr kumimoji="0" lang="en-US" sz="1800" b="0" i="0" u="none" strike="noStrike" kern="1200" cap="none" spc="0" normalizeH="0" baseline="0" noProof="0">
-              <a:ln>
-                <a:noFill/>
-              </a:ln>
-              <a:solidFill>
-                <a:prstClr val="white"/>
-              </a:solidFill>
-              <a:effectLst/>
-              <a:uLnTx/>
-              <a:uFillTx/>
-              <a:latin typeface="Calibri" panose="020F0502020204030204"/>
-              <a:ea typeface="+mn-ea"/>
-              <a:cs typeface="+mn-cs"/>
-            </a:endParaRPr>
-          </a:p>
-        </p:txBody>
-      </p:sp>
-      <p:pic>
-        <p:nvPicPr>
-          <p:cNvPr id="4" name="Content Placeholder 3">
-            <a:extLst>
-              <a:ext uri="{FF2B5EF4-FFF2-40B4-BE49-F238E27FC236}">
-                <a16:creationId xmlns:a16="http://schemas.microsoft.com/office/drawing/2014/main" id="{F17A5365-D706-4E3F-BB37-3E1B4B464635}"/>
-              </a:ext>
-            </a:extLst>
-          </p:cNvPr>
-          <p:cNvPicPr>
-            <a:picLocks noGrp="1" noChangeAspect="1"/>
-          </p:cNvPicPr>
-          <p:nvPr>
-            <p:ph idx="1"/>
-          </p:nvPr>
-        </p:nvPicPr>
-        <p:blipFill>
-          <a:blip r:embed="rId2"/>
-          <a:stretch>
-            <a:fillRect/>
-          </a:stretch>
-        </p:blipFill>
-        <p:spPr>
-          <a:xfrm>
-            <a:off x="2021252" y="152593"/>
-            <a:ext cx="7746525" cy="4667280"/>
-          </a:xfrm>
-          <a:prstGeom prst="rect">
-            <a:avLst/>
-          </a:prstGeom>
-        </p:spPr>
-      </p:pic>
-      <p:cxnSp>
-        <p:nvCxnSpPr>
-          <p:cNvPr id="14" name="Straight Connector 13">
-            <a:extLst>
-              <a:ext uri="{FF2B5EF4-FFF2-40B4-BE49-F238E27FC236}">
-                <a16:creationId xmlns:a16="http://schemas.microsoft.com/office/drawing/2014/main" id="{7E7C77BC-7138-40B1-A15B-20F57A494629}"/>
-              </a:ext>
-              <a:ext uri="{C183D7F6-B498-43B3-948B-1728B52AA6E4}">
-                <adec:decorative xmlns:adec="http://schemas.microsoft.com/office/drawing/2017/decorative" val="1"/>
-              </a:ext>
-            </a:extLst>
-          </p:cNvPr>
-          <p:cNvCxnSpPr>
-            <a:cxnSpLocks noGrp="1" noRot="1" noChangeAspect="1" noMove="1" noResize="1" noEditPoints="1" noAdjustHandles="1" noChangeArrowheads="1" noChangeShapeType="1"/>
-          </p:cNvCxnSpPr>
-          <p:nvPr>
-            <p:extLst>
-              <p:ext uri="{386F3935-93C4-4BCD-93E2-E3B085C9AB24}">
-                <p16:designElem xmlns:p16="http://schemas.microsoft.com/office/powerpoint/2015/main" val="1"/>
-              </p:ext>
-            </p:extLst>
-          </p:nvPr>
-        </p:nvCxnSpPr>
-        <p:spPr>
-          <a:xfrm>
-            <a:off x="2209800" y="5738691"/>
-            <a:ext cx="7772400" cy="0"/>
-          </a:xfrm>
-          <a:prstGeom prst="line">
-            <a:avLst/>
-          </a:prstGeom>
-          <a:ln w="22225">
-            <a:solidFill>
-              <a:srgbClr val="D9D9D9"/>
-            </a:solidFill>
-          </a:ln>
-        </p:spPr>
-        <p:style>
-          <a:lnRef idx="1">
-            <a:schemeClr val="accent1"/>
-          </a:lnRef>
-          <a:fillRef idx="0">
-            <a:schemeClr val="accent1"/>
-          </a:fillRef>
-          <a:effectRef idx="0">
-            <a:schemeClr val="accent1"/>
-          </a:effectRef>
-          <a:fontRef idx="minor">
-            <a:schemeClr val="tx1"/>
-          </a:fontRef>
-        </p:style>
-      </p:cxnSp>
-      <p:sp>
-        <p:nvSpPr>
-          <p:cNvPr id="2" name="Title 1">
-            <a:extLst>
-              <a:ext uri="{FF2B5EF4-FFF2-40B4-BE49-F238E27FC236}">
-                <a16:creationId xmlns:a16="http://schemas.microsoft.com/office/drawing/2014/main" id="{14170313-D207-4655-8299-7FF29B5D140B}"/>
+      <p:sp>
+        <p:nvSpPr>
+          <p:cNvPr id="4" name="Title 3">
+            <a:extLst>
+              <a:ext uri="{FF2B5EF4-FFF2-40B4-BE49-F238E27FC236}">
+                <a16:creationId xmlns:a16="http://schemas.microsoft.com/office/drawing/2014/main" id="{CD138661-B7C5-4927-843B-13B9D076E75A}"/>
               </a:ext>
             </a:extLst>
           </p:cNvPr>
@@ -5293,48 +5139,47 @@
             <p:ph type="title"/>
           </p:nvPr>
         </p:nvSpPr>
-        <p:spPr>
-          <a:xfrm>
-            <a:off x="527538" y="4756638"/>
-            <a:ext cx="11139854" cy="930447"/>
-          </a:xfrm>
-        </p:spPr>
-        <p:txBody>
-          <a:bodyPr vert="horz" lIns="91440" tIns="45720" rIns="91440" bIns="45720" rtlCol="0" anchor="b">
-            <a:normAutofit/>
-          </a:bodyPr>
-          <a:lstStyle/>
-          <a:p>
-            <a:pPr algn="ctr"/>
-            <a:r>
-              <a:rPr lang="en-US" sz="5400">
-                <a:solidFill>
-                  <a:srgbClr val="FFFFFF"/>
-                </a:solidFill>
-              </a:rPr>
-              <a:t>Should look like this </a:t>
-            </a:r>
-            <a:r>
-              <a:rPr lang="en-US" sz="5400">
-                <a:solidFill>
-                  <a:srgbClr val="FFFFFF"/>
-                </a:solidFill>
-                <a:sym typeface="Wingdings" panose="05000000000000000000" pitchFamily="2" charset="2"/>
-              </a:rPr>
-              <a:t></a:t>
-            </a:r>
-            <a:endParaRPr lang="en-US" sz="5400">
-              <a:solidFill>
-                <a:srgbClr val="FFFFFF"/>
-              </a:solidFill>
-            </a:endParaRPr>
+        <p:spPr/>
+        <p:txBody>
+          <a:bodyPr/>
+          <a:lstStyle/>
+          <a:p>
+            <a:r>
+              <a:rPr lang="en-US" dirty="0"/>
+              <a:t>Reference  </a:t>
+            </a:r>
+          </a:p>
+        </p:txBody>
+      </p:sp>
+      <p:sp>
+        <p:nvSpPr>
+          <p:cNvPr id="5" name="Text Placeholder 4">
+            <a:extLst>
+              <a:ext uri="{FF2B5EF4-FFF2-40B4-BE49-F238E27FC236}">
+                <a16:creationId xmlns:a16="http://schemas.microsoft.com/office/drawing/2014/main" id="{B3E993D0-F947-4952-8D6A-754E76C7C98F}"/>
+              </a:ext>
+            </a:extLst>
+          </p:cNvPr>
+          <p:cNvSpPr>
+            <a:spLocks noGrp="1"/>
+          </p:cNvSpPr>
+          <p:nvPr>
+            <p:ph type="body" idx="1"/>
+          </p:nvPr>
+        </p:nvSpPr>
+        <p:spPr/>
+        <p:txBody>
+          <a:bodyPr/>
+          <a:lstStyle/>
+          <a:p>
+            <a:endParaRPr lang="en-US" dirty="0"/>
           </a:p>
         </p:txBody>
       </p:sp>
     </p:spTree>
     <p:extLst>
       <p:ext uri="{BB962C8B-B14F-4D97-AF65-F5344CB8AC3E}">
-        <p14:creationId xmlns:p14="http://schemas.microsoft.com/office/powerpoint/2010/main" val="1111879527"/>
+        <p14:creationId xmlns:p14="http://schemas.microsoft.com/office/powerpoint/2010/main" val="1924108191"/>
       </p:ext>
     </p:extLst>
   </p:cSld>
@@ -5369,6 +5214,328 @@
           <a:chExt cx="0" cy="0"/>
         </a:xfrm>
       </p:grpSpPr>
+      <p:cxnSp>
+        <p:nvCxnSpPr>
+          <p:cNvPr id="10" name="Straight Connector 9">
+            <a:extLst>
+              <a:ext uri="{FF2B5EF4-FFF2-40B4-BE49-F238E27FC236}">
+                <a16:creationId xmlns:a16="http://schemas.microsoft.com/office/drawing/2014/main" id="{DB146403-F3D6-484B-B2ED-97F9565D0370}"/>
+              </a:ext>
+              <a:ext uri="{C183D7F6-B498-43B3-948B-1728B52AA6E4}">
+                <adec:decorative xmlns:adec="http://schemas.microsoft.com/office/drawing/2017/decorative" val="1"/>
+              </a:ext>
+            </a:extLst>
+          </p:cNvPr>
+          <p:cNvCxnSpPr>
+            <a:cxnSpLocks noGrp="1" noRot="1" noChangeAspect="1" noMove="1" noResize="1" noEditPoints="1" noAdjustHandles="1" noChangeArrowheads="1" noChangeShapeType="1"/>
+          </p:cNvCxnSpPr>
+          <p:nvPr>
+            <p:extLst>
+              <p:ext uri="{386F3935-93C4-4BCD-93E2-E3B085C9AB24}">
+                <p16:designElem xmlns:p16="http://schemas.microsoft.com/office/powerpoint/2015/main" val="1"/>
+              </p:ext>
+            </p:extLst>
+          </p:nvPr>
+        </p:nvCxnSpPr>
+        <p:spPr>
+          <a:xfrm>
+            <a:off x="6096000" y="477749"/>
+            <a:ext cx="0" cy="3657600"/>
+          </a:xfrm>
+          <a:prstGeom prst="line">
+            <a:avLst/>
+          </a:prstGeom>
+          <a:ln w="101600" cmpd="dbl">
+            <a:solidFill>
+              <a:srgbClr val="595959"/>
+            </a:solidFill>
+          </a:ln>
+        </p:spPr>
+        <p:style>
+          <a:lnRef idx="1">
+            <a:schemeClr val="accent1"/>
+          </a:lnRef>
+          <a:fillRef idx="0">
+            <a:schemeClr val="accent1"/>
+          </a:fillRef>
+          <a:effectRef idx="0">
+            <a:schemeClr val="accent1"/>
+          </a:effectRef>
+          <a:fontRef idx="minor">
+            <a:schemeClr val="tx1"/>
+          </a:fontRef>
+        </p:style>
+      </p:cxnSp>
+      <p:sp>
+        <p:nvSpPr>
+          <p:cNvPr id="12" name="Rectangle 11">
+            <a:extLst>
+              <a:ext uri="{FF2B5EF4-FFF2-40B4-BE49-F238E27FC236}">
+                <a16:creationId xmlns:a16="http://schemas.microsoft.com/office/drawing/2014/main" id="{823AC064-BC96-4F32-8AE1-B2FD38754823}"/>
+              </a:ext>
+              <a:ext uri="{C183D7F6-B498-43B3-948B-1728B52AA6E4}">
+                <adec:decorative xmlns:adec="http://schemas.microsoft.com/office/drawing/2017/decorative" val="1"/>
+              </a:ext>
+            </a:extLst>
+          </p:cNvPr>
+          <p:cNvSpPr>
+            <a:spLocks noGrp="1" noRot="1" noChangeAspect="1" noMove="1" noResize="1" noEditPoints="1" noAdjustHandles="1" noChangeArrowheads="1" noChangeShapeType="1" noTextEdit="1"/>
+          </p:cNvSpPr>
+          <p:nvPr>
+            <p:extLst>
+              <p:ext uri="{386F3935-93C4-4BCD-93E2-E3B085C9AB24}">
+                <p16:designElem xmlns:p16="http://schemas.microsoft.com/office/powerpoint/2015/main" val="1"/>
+              </p:ext>
+            </p:extLst>
+          </p:nvPr>
+        </p:nvSpPr>
+        <p:spPr bwMode="ltGray">
+          <a:xfrm>
+            <a:off x="378068" y="4633546"/>
+            <a:ext cx="11438793" cy="1844256"/>
+          </a:xfrm>
+          <a:prstGeom prst="rect">
+            <a:avLst/>
+          </a:prstGeom>
+          <a:solidFill>
+            <a:srgbClr val="404040"/>
+          </a:solidFill>
+          <a:ln w="127000" cap="sq" cmpd="thinThick">
+            <a:solidFill>
+              <a:srgbClr val="404040"/>
+            </a:solidFill>
+          </a:ln>
+        </p:spPr>
+        <p:style>
+          <a:lnRef idx="2">
+            <a:schemeClr val="accent1">
+              <a:shade val="50000"/>
+            </a:schemeClr>
+          </a:lnRef>
+          <a:fillRef idx="1">
+            <a:schemeClr val="accent1"/>
+          </a:fillRef>
+          <a:effectRef idx="0">
+            <a:schemeClr val="accent1"/>
+          </a:effectRef>
+          <a:fontRef idx="minor">
+            <a:schemeClr val="lt1"/>
+          </a:fontRef>
+        </p:style>
+        <p:txBody>
+          <a:bodyPr rtlCol="0" anchor="ctr"/>
+          <a:lstStyle/>
+          <a:p>
+            <a:pPr marL="0" marR="0" lvl="0" indent="0" algn="ctr" defTabSz="914400" rtl="0" eaLnBrk="1" fontAlgn="auto" latinLnBrk="0" hangingPunct="1">
+              <a:lnSpc>
+                <a:spcPct val="100000"/>
+              </a:lnSpc>
+              <a:spcBef>
+                <a:spcPts val="0"/>
+              </a:spcBef>
+              <a:spcAft>
+                <a:spcPts val="0"/>
+              </a:spcAft>
+              <a:buClrTx/>
+              <a:buSzTx/>
+              <a:buFontTx/>
+              <a:buNone/>
+              <a:tabLst/>
+              <a:defRPr/>
+            </a:pPr>
+            <a:endParaRPr kumimoji="0" lang="en-US" sz="1800" b="0" i="0" u="none" strike="noStrike" kern="1200" cap="none" spc="0" normalizeH="0" baseline="0" noProof="0">
+              <a:ln>
+                <a:noFill/>
+              </a:ln>
+              <a:solidFill>
+                <a:prstClr val="white"/>
+              </a:solidFill>
+              <a:effectLst/>
+              <a:uLnTx/>
+              <a:uFillTx/>
+              <a:latin typeface="Calibri" panose="020F0502020204030204"/>
+              <a:ea typeface="+mn-ea"/>
+              <a:cs typeface="+mn-cs"/>
+            </a:endParaRPr>
+          </a:p>
+        </p:txBody>
+      </p:sp>
+      <p:pic>
+        <p:nvPicPr>
+          <p:cNvPr id="4" name="Content Placeholder 3">
+            <a:extLst>
+              <a:ext uri="{FF2B5EF4-FFF2-40B4-BE49-F238E27FC236}">
+                <a16:creationId xmlns:a16="http://schemas.microsoft.com/office/drawing/2014/main" id="{F17A5365-D706-4E3F-BB37-3E1B4B464635}"/>
+              </a:ext>
+            </a:extLst>
+          </p:cNvPr>
+          <p:cNvPicPr>
+            <a:picLocks noGrp="1" noChangeAspect="1"/>
+          </p:cNvPicPr>
+          <p:nvPr>
+            <p:ph idx="1"/>
+          </p:nvPr>
+        </p:nvPicPr>
+        <p:blipFill>
+          <a:blip r:embed="rId2"/>
+          <a:stretch>
+            <a:fillRect/>
+          </a:stretch>
+        </p:blipFill>
+        <p:spPr>
+          <a:xfrm>
+            <a:off x="2021252" y="152593"/>
+            <a:ext cx="7746525" cy="4667280"/>
+          </a:xfrm>
+          <a:prstGeom prst="rect">
+            <a:avLst/>
+          </a:prstGeom>
+        </p:spPr>
+      </p:pic>
+      <p:cxnSp>
+        <p:nvCxnSpPr>
+          <p:cNvPr id="14" name="Straight Connector 13">
+            <a:extLst>
+              <a:ext uri="{FF2B5EF4-FFF2-40B4-BE49-F238E27FC236}">
+                <a16:creationId xmlns:a16="http://schemas.microsoft.com/office/drawing/2014/main" id="{7E7C77BC-7138-40B1-A15B-20F57A494629}"/>
+              </a:ext>
+              <a:ext uri="{C183D7F6-B498-43B3-948B-1728B52AA6E4}">
+                <adec:decorative xmlns:adec="http://schemas.microsoft.com/office/drawing/2017/decorative" val="1"/>
+              </a:ext>
+            </a:extLst>
+          </p:cNvPr>
+          <p:cNvCxnSpPr>
+            <a:cxnSpLocks noGrp="1" noRot="1" noChangeAspect="1" noMove="1" noResize="1" noEditPoints="1" noAdjustHandles="1" noChangeArrowheads="1" noChangeShapeType="1"/>
+          </p:cNvCxnSpPr>
+          <p:nvPr>
+            <p:extLst>
+              <p:ext uri="{386F3935-93C4-4BCD-93E2-E3B085C9AB24}">
+                <p16:designElem xmlns:p16="http://schemas.microsoft.com/office/powerpoint/2015/main" val="1"/>
+              </p:ext>
+            </p:extLst>
+          </p:nvPr>
+        </p:nvCxnSpPr>
+        <p:spPr>
+          <a:xfrm>
+            <a:off x="2209800" y="5738691"/>
+            <a:ext cx="7772400" cy="0"/>
+          </a:xfrm>
+          <a:prstGeom prst="line">
+            <a:avLst/>
+          </a:prstGeom>
+          <a:ln w="22225">
+            <a:solidFill>
+              <a:srgbClr val="D9D9D9"/>
+            </a:solidFill>
+          </a:ln>
+        </p:spPr>
+        <p:style>
+          <a:lnRef idx="1">
+            <a:schemeClr val="accent1"/>
+          </a:lnRef>
+          <a:fillRef idx="0">
+            <a:schemeClr val="accent1"/>
+          </a:fillRef>
+          <a:effectRef idx="0">
+            <a:schemeClr val="accent1"/>
+          </a:effectRef>
+          <a:fontRef idx="minor">
+            <a:schemeClr val="tx1"/>
+          </a:fontRef>
+        </p:style>
+      </p:cxnSp>
+      <p:sp>
+        <p:nvSpPr>
+          <p:cNvPr id="2" name="Title 1">
+            <a:extLst>
+              <a:ext uri="{FF2B5EF4-FFF2-40B4-BE49-F238E27FC236}">
+                <a16:creationId xmlns:a16="http://schemas.microsoft.com/office/drawing/2014/main" id="{14170313-D207-4655-8299-7FF29B5D140B}"/>
+              </a:ext>
+            </a:extLst>
+          </p:cNvPr>
+          <p:cNvSpPr>
+            <a:spLocks noGrp="1"/>
+          </p:cNvSpPr>
+          <p:nvPr>
+            <p:ph type="title"/>
+          </p:nvPr>
+        </p:nvSpPr>
+        <p:spPr>
+          <a:xfrm>
+            <a:off x="527538" y="4756638"/>
+            <a:ext cx="11139854" cy="930447"/>
+          </a:xfrm>
+        </p:spPr>
+        <p:txBody>
+          <a:bodyPr vert="horz" lIns="91440" tIns="45720" rIns="91440" bIns="45720" rtlCol="0" anchor="b">
+            <a:normAutofit/>
+          </a:bodyPr>
+          <a:lstStyle/>
+          <a:p>
+            <a:pPr algn="ctr"/>
+            <a:r>
+              <a:rPr lang="en-US" sz="5400">
+                <a:solidFill>
+                  <a:srgbClr val="FFFFFF"/>
+                </a:solidFill>
+              </a:rPr>
+              <a:t>Should look like this </a:t>
+            </a:r>
+            <a:r>
+              <a:rPr lang="en-US" sz="5400">
+                <a:solidFill>
+                  <a:srgbClr val="FFFFFF"/>
+                </a:solidFill>
+                <a:sym typeface="Wingdings" panose="05000000000000000000" pitchFamily="2" charset="2"/>
+              </a:rPr>
+              <a:t></a:t>
+            </a:r>
+            <a:endParaRPr lang="en-US" sz="5400">
+              <a:solidFill>
+                <a:srgbClr val="FFFFFF"/>
+              </a:solidFill>
+            </a:endParaRPr>
+          </a:p>
+        </p:txBody>
+      </p:sp>
+    </p:spTree>
+    <p:extLst>
+      <p:ext uri="{BB962C8B-B14F-4D97-AF65-F5344CB8AC3E}">
+        <p14:creationId xmlns:p14="http://schemas.microsoft.com/office/powerpoint/2010/main" val="1111879527"/>
+      </p:ext>
+    </p:extLst>
+  </p:cSld>
+  <p:clrMapOvr>
+    <a:masterClrMapping/>
+  </p:clrMapOvr>
+</p:sld>
+</file>
+
+<file path=ppt/slides/slide14.xml><?xml version="1.0" encoding="utf-8"?>
+<p:sld xmlns:a="http://schemas.openxmlformats.org/drawingml/2006/main" xmlns:r="http://schemas.openxmlformats.org/officeDocument/2006/relationships" xmlns:p="http://schemas.openxmlformats.org/presentationml/2006/main">
+  <p:cSld>
+    <p:bg>
+      <p:bgPr>
+        <a:solidFill>
+          <a:schemeClr val="bg1"/>
+        </a:solidFill>
+        <a:effectLst/>
+      </p:bgPr>
+    </p:bg>
+    <p:spTree>
+      <p:nvGrpSpPr>
+        <p:cNvPr id="1" name=""/>
+        <p:cNvGrpSpPr/>
+        <p:nvPr/>
+      </p:nvGrpSpPr>
+      <p:grpSpPr>
+        <a:xfrm>
+          <a:off x="0" y="0"/>
+          <a:ext cx="0" cy="0"/>
+          <a:chOff x="0" y="0"/>
+          <a:chExt cx="0" cy="0"/>
+        </a:xfrm>
+      </p:grpSpPr>
       <p:sp>
         <p:nvSpPr>
           <p:cNvPr id="2" name="Title 1">
@@ -5560,7 +5727,7 @@
 </p:sld>
 </file>
 
-<file path=ppt/slides/slide14.xml><?xml version="1.0" encoding="utf-8"?>
+<file path=ppt/slides/slide15.xml><?xml version="1.0" encoding="utf-8"?>
 <p:sld xmlns:a="http://schemas.openxmlformats.org/drawingml/2006/main" xmlns:r="http://schemas.openxmlformats.org/officeDocument/2006/relationships" xmlns:p="http://schemas.openxmlformats.org/presentationml/2006/main">
   <p:cSld>
     <p:spTree>
@@ -6160,26 +6327,29 @@
         </p:spPr>
         <p:txBody>
           <a:bodyPr>
-            <a:normAutofit/>
+            <a:normAutofit fontScale="85000" lnSpcReduction="10000"/>
           </a:bodyPr>
           <a:lstStyle/>
           <a:p>
             <a:r>
               <a:rPr lang="en-US" dirty="0"/>
-              <a:t>Deploy Infra using PowerShell and ARM template</a:t>
+              <a:t>Deploy Infra using PowerShell \ CLI and an ARM Template</a:t>
             </a:r>
           </a:p>
           <a:p>
             <a:pPr lvl="1"/>
             <a:r>
               <a:rPr lang="en-US" dirty="0"/>
-              <a:t>Setup Azure Module on Windows PowerShell - </a:t>
-            </a:r>
+              <a:t>Setup Azure Module on Windows PowerShell</a:t>
+            </a:r>
+            <a:br>
+              <a:rPr lang="en-US" dirty="0"/>
+            </a:br>
             <a:r>
               <a:rPr lang="en-US" dirty="0">
                 <a:hlinkClick r:id="rId3"/>
               </a:rPr>
-              <a:t>https://docs.microsoft.com/en-us/powershell/azure/install-azurerm-ps?view=azurermps-6.1.0</a:t>
+              <a:t>https://docs.microsoft.com/en-us/powershell/azure/install-azurerm-ps?view=azurermps-6.9.0</a:t>
             </a:r>
             <a:endParaRPr lang="en-US" dirty="0"/>
           </a:p>
@@ -6187,19 +6357,95 @@
             <a:pPr lvl="1"/>
             <a:r>
               <a:rPr lang="en-US" dirty="0"/>
-              <a:t>Install VS Code (make sure to install the Azure ARM and PowerShell extensions)</a:t>
-            </a:r>
-          </a:p>
-          <a:p>
-            <a:pPr lvl="1"/>
-            <a:r>
-              <a:rPr lang="en-US" dirty="0"/>
-              <a:t>Download Azure Monitoring Hackathon as a zip file and extract it to a folder - </a:t>
-            </a:r>
+              <a:t>Setup Azure CLI</a:t>
+            </a:r>
+            <a:br>
+              <a:rPr lang="en-US" dirty="0"/>
+            </a:br>
             <a:r>
               <a:rPr lang="en-US" dirty="0">
                 <a:hlinkClick r:id="rId4"/>
               </a:rPr>
+              <a:t>https://docs.microsoft.com/en-us/cli/azure/install-azure-cli?view=azure-cli-latest</a:t>
+            </a:r>
+            <a:endParaRPr lang="en-US" dirty="0"/>
+          </a:p>
+          <a:p>
+            <a:pPr lvl="1"/>
+            <a:r>
+              <a:rPr lang="en-US" dirty="0"/>
+              <a:t>Install Visual Studio Code and Extensions (depending on your tool of choice)</a:t>
+            </a:r>
+          </a:p>
+          <a:p>
+            <a:pPr lvl="2"/>
+            <a:r>
+              <a:rPr lang="en-US" dirty="0"/>
+              <a:t>Azure Resource Manager Tools - </a:t>
+            </a:r>
+            <a:r>
+              <a:rPr lang="en-US" dirty="0">
+                <a:hlinkClick r:id="rId5"/>
+              </a:rPr>
+              <a:t>https://marketplace.visualstudio.com/items?itemName=msazurermtools.azurerm-vscode-tools</a:t>
+            </a:r>
+            <a:endParaRPr lang="en-US" dirty="0"/>
+          </a:p>
+          <a:p>
+            <a:pPr lvl="2"/>
+            <a:r>
+              <a:rPr lang="en-US" dirty="0"/>
+              <a:t>ARM snippets - </a:t>
+            </a:r>
+            <a:r>
+              <a:rPr lang="en-US" dirty="0">
+                <a:hlinkClick r:id="rId6"/>
+              </a:rPr>
+              <a:t>https://marketplace.visualstudio.com/items?itemName=artofshell.armsnippet</a:t>
+            </a:r>
+            <a:endParaRPr lang="en-US" dirty="0"/>
+          </a:p>
+          <a:p>
+            <a:pPr lvl="2"/>
+            <a:r>
+              <a:rPr lang="en-US" dirty="0"/>
+              <a:t>PowerShell - </a:t>
+            </a:r>
+            <a:r>
+              <a:rPr lang="en-US" dirty="0">
+                <a:hlinkClick r:id="rId7"/>
+              </a:rPr>
+              <a:t>https://marketplace.visualstudio.com/items?itemName=ms-vscode.PowerShell</a:t>
+            </a:r>
+            <a:endParaRPr lang="en-US" dirty="0"/>
+          </a:p>
+          <a:p>
+            <a:pPr lvl="2"/>
+            <a:r>
+              <a:rPr lang="en-US" dirty="0"/>
+              <a:t>Azure CLI Tools – </a:t>
+            </a:r>
+            <a:br>
+              <a:rPr lang="en-US" dirty="0"/>
+            </a:br>
+            <a:r>
+              <a:rPr lang="en-US" dirty="0">
+                <a:hlinkClick r:id="rId8"/>
+              </a:rPr>
+              <a:t>https://marketplace.visualstudio.com/items?itemName=ms-vscode.azurecli</a:t>
+            </a:r>
+            <a:endParaRPr lang="en-US" dirty="0"/>
+          </a:p>
+          <a:p>
+            <a:pPr lvl="1"/>
+            <a:r>
+              <a:rPr lang="en-US" dirty="0"/>
+              <a:t>Download Azure Monitoring Hackathon as a zip file and extract it to a folder - </a:t>
+            </a:r>
+            <a:r>
+              <a:rPr lang="en-US" dirty="0">
+                <a:hlinkClick r:id="rId9"/>
+              </a:rPr>
               <a:t>https://github.com/rkuehfus/AzureMonitoringHackathon</a:t>
             </a:r>
             <a:r>
@@ -6211,7 +6457,23 @@
             <a:pPr lvl="1"/>
             <a:r>
               <a:rPr lang="en-US" dirty="0"/>
-              <a:t>From the folder, open the DeployMonHackEnv.ps1 and </a:t>
+              <a:t>From the folder, open the </a:t>
+            </a:r>
+            <a:r>
+              <a:rPr lang="en-US" dirty="0" err="1"/>
+              <a:t>DeployMonHackEnv</a:t>
+            </a:r>
+            <a:r>
+              <a:rPr lang="en-US" dirty="0"/>
+              <a:t>.(ps1 or </a:t>
+            </a:r>
+            <a:r>
+              <a:rPr lang="en-US" dirty="0" err="1"/>
+              <a:t>sh</a:t>
+            </a:r>
+            <a:r>
+              <a:rPr lang="en-US" dirty="0"/>
+              <a:t>) and </a:t>
             </a:r>
             <a:r>
               <a:rPr lang="en-US" dirty="0" err="1"/>
@@ -6646,7 +6908,7 @@
             <a:pPr lvl="1"/>
             <a:r>
               <a:rPr lang="en-US" sz="1600" dirty="0"/>
-              <a:t>Extra Credit: Update your ARM Template to enable guest-level monitoring on the SQL Server and add a the metric above.</a:t>
+              <a:t>Extra Credit: Update your ARM Template to enable guest-level monitoring on the SQL Server and add the metric above.</a:t>
             </a:r>
           </a:p>
           <a:p>
@@ -6746,7 +7008,7 @@
           <p:cNvPr id="2" name="Title 1">
             <a:extLst>
               <a:ext uri="{FF2B5EF4-FFF2-40B4-BE49-F238E27FC236}">
-                <a16:creationId xmlns:a16="http://schemas.microsoft.com/office/drawing/2014/main" id="{9103BE6A-C3F7-45A9-AAB2-2D815440BC0A}"/>
+                <a16:creationId xmlns:a16="http://schemas.microsoft.com/office/drawing/2014/main" id="{60058EC1-5D04-4F24-9182-0E3316DEB259}"/>
               </a:ext>
             </a:extLst>
           </p:cNvPr>
@@ -6757,14 +7019,21 @@
             <p:ph type="title"/>
           </p:nvPr>
         </p:nvSpPr>
-        <p:spPr/>
-        <p:txBody>
-          <a:bodyPr/>
-          <a:lstStyle/>
-          <a:p>
-            <a:r>
-              <a:rPr lang="en-US" dirty="0"/>
-              <a:t>Log Analytics Challenges</a:t>
+        <p:spPr>
+          <a:xfrm>
+            <a:off x="838200" y="365125"/>
+            <a:ext cx="10919460" cy="832739"/>
+          </a:xfrm>
+        </p:spPr>
+        <p:txBody>
+          <a:bodyPr>
+            <a:normAutofit fontScale="90000"/>
+          </a:bodyPr>
+          <a:lstStyle/>
+          <a:p>
+            <a:r>
+              <a:rPr lang="en-US" dirty="0"/>
+              <a:t>Monitoring and Alerting Automation Challenge	</a:t>
             </a:r>
           </a:p>
         </p:txBody>
@@ -6774,7 +7043,7 @@
           <p:cNvPr id="3" name="Content Placeholder 2">
             <a:extLst>
               <a:ext uri="{FF2B5EF4-FFF2-40B4-BE49-F238E27FC236}">
-                <a16:creationId xmlns:a16="http://schemas.microsoft.com/office/drawing/2014/main" id="{83B3D083-6DDC-4DF6-842F-2957BF37C439}"/>
+                <a16:creationId xmlns:a16="http://schemas.microsoft.com/office/drawing/2014/main" id="{F6074475-A229-48AD-8729-0FD1E62F0B0C}"/>
               </a:ext>
             </a:extLst>
           </p:cNvPr>
@@ -6785,102 +7054,113 @@
             <p:ph idx="1"/>
           </p:nvPr>
         </p:nvSpPr>
-        <p:spPr/>
+        <p:spPr>
+          <a:xfrm>
+            <a:off x="434340" y="1434465"/>
+            <a:ext cx="10919460" cy="5120640"/>
+          </a:xfrm>
+        </p:spPr>
         <p:txBody>
           <a:bodyPr>
-            <a:normAutofit fontScale="85000" lnSpcReduction="20000"/>
+            <a:normAutofit/>
           </a:bodyPr>
           <a:lstStyle/>
           <a:p>
             <a:r>
-              <a:rPr lang="en-US" dirty="0"/>
-              <a:t>Create a new Log Analytics Workspace</a:t>
+              <a:rPr lang="en-US" sz="2000" dirty="0"/>
+              <a:t>Update the parameters file and deployment script for the </a:t>
+            </a:r>
+            <a:r>
+              <a:rPr lang="en-US" sz="2000" dirty="0" err="1"/>
+              <a:t>GenerateAlertRules.json</a:t>
+            </a:r>
+            <a:r>
+              <a:rPr lang="en-US" sz="2000" dirty="0"/>
+              <a:t> template located in the </a:t>
+            </a:r>
+            <a:r>
+              <a:rPr lang="en-US" sz="2000" dirty="0" err="1"/>
+              <a:t>AlertTemplates</a:t>
+            </a:r>
+            <a:r>
+              <a:rPr lang="en-US" sz="2000" dirty="0"/>
+              <a:t> folder</a:t>
             </a:r>
           </a:p>
           <a:p>
             <a:pPr lvl="1"/>
             <a:r>
-              <a:rPr lang="en-US" dirty="0"/>
-              <a:t>From the portal connect SQL Server to your workspace. </a:t>
-            </a:r>
-          </a:p>
-          <a:p>
-            <a:pPr lvl="1"/>
-            <a:r>
-              <a:rPr lang="en-US" dirty="0"/>
-              <a:t>Modify the ARM template to automatically connect your VM Scale Set to the workspace.  Then redeploy template and verify the Web and SQL servers are connected</a:t>
-            </a:r>
-          </a:p>
-          <a:p>
-            <a:pPr lvl="1"/>
-            <a:r>
-              <a:rPr lang="en-US" dirty="0"/>
-              <a:t>Connect the Azure Activity Log, NSG, LB, Key Vault and Storage Account</a:t>
-            </a:r>
-          </a:p>
-          <a:p>
-            <a:pPr lvl="1"/>
-            <a:r>
-              <a:rPr lang="en-US" dirty="0"/>
-              <a:t>Add the following solutions: Activity Log Analytics, Key Vault, Agent Health, Alert Management</a:t>
-            </a:r>
-          </a:p>
-          <a:p>
-            <a:pPr lvl="1"/>
-            <a:r>
-              <a:rPr lang="en-US" dirty="0"/>
-              <a:t>Add the standard performance counters, Application and System Event logs and IIS logs.</a:t>
-            </a:r>
-          </a:p>
-          <a:p>
-            <a:r>
-              <a:rPr lang="en-US" dirty="0"/>
-              <a:t>Deploy Service Map agents to Web Scale Set VMs and SQL Servers</a:t>
-            </a:r>
-          </a:p>
-          <a:p>
-            <a:pPr lvl="1"/>
-            <a:r>
-              <a:rPr lang="en-US" dirty="0"/>
-              <a:t>Create a FE and BE group in Service Map</a:t>
-            </a:r>
-          </a:p>
-          <a:p>
-            <a:pPr lvl="1"/>
-            <a:r>
-              <a:rPr lang="en-US" dirty="0"/>
-              <a:t>Generate DB load using </a:t>
-            </a:r>
-            <a:r>
-              <a:rPr lang="en-US" dirty="0" err="1"/>
-              <a:t>HammerDB</a:t>
-            </a:r>
-            <a:r>
-              <a:rPr lang="en-US" dirty="0"/>
-              <a:t> from the Visual Studio Server and view the results in Service Map</a:t>
-            </a:r>
-          </a:p>
-          <a:p>
-            <a:r>
-              <a:rPr lang="en-US" dirty="0"/>
-              <a:t>First Team to email me a screenshot with the Visual Studio Server detected by your Scale Set and detected by Service Map wins the challenge.  Good luck!</a:t>
-            </a:r>
-          </a:p>
-          <a:p>
-            <a:endParaRPr lang="en-US" dirty="0"/>
-          </a:p>
-          <a:p>
-            <a:endParaRPr lang="en-US" dirty="0"/>
-          </a:p>
-          <a:p>
-            <a:endParaRPr lang="en-US" dirty="0"/>
+              <a:rPr lang="en-US" sz="1600" dirty="0"/>
+              <a:t>Add the names of your VMs and </a:t>
+            </a:r>
+            <a:r>
+              <a:rPr lang="en-US" sz="1600" dirty="0" err="1"/>
+              <a:t>ResouceId</a:t>
+            </a:r>
+            <a:r>
+              <a:rPr lang="en-US" sz="1600" dirty="0"/>
+              <a:t> for your Action Group</a:t>
+            </a:r>
+          </a:p>
+          <a:p>
+            <a:r>
+              <a:rPr lang="en-US" sz="2000" dirty="0"/>
+              <a:t>Deploy the </a:t>
+            </a:r>
+            <a:r>
+              <a:rPr lang="en-US" sz="2000" dirty="0" err="1"/>
+              <a:t>GenerateAlertRules.json</a:t>
+            </a:r>
+            <a:r>
+              <a:rPr lang="en-US" sz="2000" dirty="0"/>
+              <a:t> template using the sample PowerShell script (deployAlertRulesTemplate.ps1) or create a Bash script (look at the example from the initial deployment)</a:t>
+            </a:r>
+            <a:endParaRPr lang="en-US" sz="1600" dirty="0"/>
+          </a:p>
+          <a:p>
+            <a:r>
+              <a:rPr lang="en-US" sz="2000" dirty="0"/>
+              <a:t>Verify you have new Monitor Alert Rules in the Portal or from the command line (sample command is in the deployment script)</a:t>
+            </a:r>
+          </a:p>
+          <a:p>
+            <a:r>
+              <a:rPr lang="en-US" sz="2000" dirty="0"/>
+              <a:t>Modify the </a:t>
+            </a:r>
+            <a:r>
+              <a:rPr lang="en-US" sz="2000" dirty="0" err="1"/>
+              <a:t>GenerateAlertsRules.json</a:t>
+            </a:r>
+            <a:r>
+              <a:rPr lang="en-US" sz="2000" dirty="0"/>
+              <a:t> to include “Disk Write Operations/Sec” and set a threshold of 10</a:t>
+            </a:r>
+          </a:p>
+          <a:p>
+            <a:r>
+              <a:rPr lang="en-US" sz="2000" dirty="0"/>
+              <a:t>Rerun your template and verify your new Alert Rules are created for each of your VMs</a:t>
+            </a:r>
+          </a:p>
+          <a:p>
+            <a:r>
+              <a:rPr lang="en-US" sz="2000" dirty="0"/>
+              <a:t>First team to me a screenshot of the new Alert Rules wins the challenge!!</a:t>
+            </a:r>
+          </a:p>
+          <a:p>
+            <a:r>
+              <a:rPr lang="en-US" sz="2000" dirty="0"/>
+              <a:t>Good luck!</a:t>
+            </a:r>
           </a:p>
         </p:txBody>
       </p:sp>
     </p:spTree>
     <p:extLst>
       <p:ext uri="{BB962C8B-B14F-4D97-AF65-F5344CB8AC3E}">
-        <p14:creationId xmlns:p14="http://schemas.microsoft.com/office/powerpoint/2010/main" val="4232406185"/>
+        <p14:creationId xmlns:p14="http://schemas.microsoft.com/office/powerpoint/2010/main" val="3193180807"/>
       </p:ext>
     </p:extLst>
   </p:cSld>
@@ -6930,7 +7210,7 @@
           <a:p>
             <a:r>
               <a:rPr lang="en-US" dirty="0"/>
-              <a:t>Log Analytics Dashboard Challenge</a:t>
+              <a:t>Log Analytics Challenges</a:t>
             </a:r>
           </a:p>
         </p:txBody>
@@ -6954,88 +7234,88 @@
         <p:spPr/>
         <p:txBody>
           <a:bodyPr>
-            <a:normAutofit fontScale="92500" lnSpcReduction="20000"/>
+            <a:normAutofit fontScale="85000" lnSpcReduction="20000"/>
           </a:bodyPr>
           <a:lstStyle/>
           <a:p>
             <a:r>
               <a:rPr lang="en-US" dirty="0"/>
-              <a:t>Write Custom Performance queries for Web and SQL Servers and save to favorites</a:t>
+              <a:t>Create a new Log Analytics Workspace</a:t>
             </a:r>
           </a:p>
           <a:p>
             <a:pPr lvl="1"/>
             <a:r>
               <a:rPr lang="en-US" dirty="0"/>
-              <a:t>Processor Utilization: Processor / % Processor Time</a:t>
+              <a:t>From the portal connect SQL Server to your workspace. </a:t>
             </a:r>
           </a:p>
           <a:p>
             <a:pPr lvl="1"/>
             <a:r>
               <a:rPr lang="en-US" dirty="0"/>
-              <a:t>Memory Utilization: Memory / % Committed Bytes In Use</a:t>
+              <a:t>Modify the ARM template to automatically connect your VM Scale Set to the workspace.  Then redeploy template and verify the Web and SQL servers are connected</a:t>
             </a:r>
           </a:p>
           <a:p>
             <a:pPr lvl="1"/>
             <a:r>
               <a:rPr lang="en-US" dirty="0"/>
-              <a:t>Disk Utilization (IO): Disk Reads/sec and Disk Writes/sec</a:t>
-            </a:r>
-          </a:p>
-          <a:p>
-            <a:r>
-              <a:rPr lang="en-US" dirty="0"/>
-              <a:t>Render the queries in a </a:t>
+              <a:t>Connect the Azure Activity Log, NSG, LB, Key Vault and Storage Account</a:t>
+            </a:r>
+          </a:p>
+          <a:p>
+            <a:pPr lvl="1"/>
+            <a:r>
+              <a:rPr lang="en-US" dirty="0"/>
+              <a:t>Add the following solutions: Activity Log Analytics, Key Vault, Agent Health, Alert Management</a:t>
+            </a:r>
+          </a:p>
+          <a:p>
+            <a:pPr lvl="1"/>
+            <a:r>
+              <a:rPr lang="en-US" dirty="0"/>
+              <a:t>Add the standard performance counters, Application and System Event logs and IIS logs.</a:t>
+            </a:r>
+          </a:p>
+          <a:p>
+            <a:r>
+              <a:rPr lang="en-US" dirty="0"/>
+              <a:t>Deploy Service Map agents to Web Scale Set VMs and SQL Servers</a:t>
+            </a:r>
+          </a:p>
+          <a:p>
+            <a:pPr lvl="1"/>
+            <a:r>
+              <a:rPr lang="en-US" dirty="0"/>
+              <a:t>Create a FE and BE group in Service Map</a:t>
+            </a:r>
+          </a:p>
+          <a:p>
+            <a:pPr lvl="1"/>
+            <a:r>
+              <a:rPr lang="en-US" dirty="0"/>
+              <a:t>Generate DB load using </a:t>
             </a:r>
             <a:r>
               <a:rPr lang="en-US" dirty="0" err="1"/>
-              <a:t>timechart</a:t>
-            </a:r>
-            <a:r>
-              <a:rPr lang="en-US" dirty="0"/>
-              <a:t> for the last 4 hours and save to favorites</a:t>
-            </a:r>
-          </a:p>
-          <a:p>
-            <a:r>
-              <a:rPr lang="en-US" dirty="0"/>
-              <a:t>Create a heartbeat query for Web and SQL Server</a:t>
-            </a:r>
-          </a:p>
-          <a:p>
-            <a:r>
-              <a:rPr lang="en-US" dirty="0"/>
-              <a:t>Create a Log Analytics Solution </a:t>
-            </a:r>
-          </a:p>
-          <a:p>
-            <a:pPr lvl="1"/>
-            <a:r>
-              <a:rPr lang="en-US" dirty="0"/>
-              <a:t>Use your heartbeat query for the Overview tile</a:t>
-            </a:r>
-          </a:p>
-          <a:p>
-            <a:pPr lvl="1"/>
-            <a:r>
-              <a:rPr lang="en-US" dirty="0"/>
-              <a:t>Use your performance queries to create a line chart &amp; list for Processor, Memory and Disk (Reads &amp; Writes).</a:t>
-            </a:r>
-          </a:p>
-          <a:p>
-            <a:r>
-              <a:rPr lang="en-US" dirty="0"/>
-              <a:t>First Team to email me a screenshot with your Solution wins the challenge.  Good luck!</a:t>
-            </a:r>
-          </a:p>
-          <a:p>
-            <a:pPr lvl="1"/>
+              <a:t>HammerDB</a:t>
+            </a:r>
+            <a:r>
+              <a:rPr lang="en-US" dirty="0"/>
+              <a:t> from the Visual Studio Server and view the results in Service Map</a:t>
+            </a:r>
+          </a:p>
+          <a:p>
+            <a:r>
+              <a:rPr lang="en-US" dirty="0"/>
+              <a:t>First Team to email me a screenshot with the Visual Studio Server detected by your Scale Set and detected by Service Map wins the challenge.  Good luck!</a:t>
+            </a:r>
+          </a:p>
+          <a:p>
             <a:endParaRPr lang="en-US" dirty="0"/>
           </a:p>
           <a:p>
-            <a:pPr lvl="1"/>
             <a:endParaRPr lang="en-US" dirty="0"/>
           </a:p>
           <a:p>
@@ -7046,7 +7326,7 @@
     </p:spTree>
     <p:extLst>
       <p:ext uri="{BB962C8B-B14F-4D97-AF65-F5344CB8AC3E}">
-        <p14:creationId xmlns:p14="http://schemas.microsoft.com/office/powerpoint/2010/main" val="340413092"/>
+        <p14:creationId xmlns:p14="http://schemas.microsoft.com/office/powerpoint/2010/main" val="4232406185"/>
       </p:ext>
     </p:extLst>
   </p:cSld>

</xml_diff>